<commit_message>
pushing latest proposal ver
</commit_message>
<xml_diff>
--- a/Seminar/s4532119_seminar_slides.pptx
+++ b/Seminar/s4532119_seminar_slides.pptx
@@ -4,15 +4,25 @@
   <p:sldMasterIdLst>
     <p:sldMasterId id="2147483648" r:id="rId1"/>
   </p:sldMasterIdLst>
+  <p:notesMasterIdLst>
+    <p:notesMasterId r:id="rId17"/>
+  </p:notesMasterIdLst>
   <p:sldIdLst>
     <p:sldId id="256" r:id="rId2"/>
-    <p:sldId id="257" r:id="rId3"/>
-    <p:sldId id="260" r:id="rId4"/>
-    <p:sldId id="259" r:id="rId5"/>
-    <p:sldId id="258" r:id="rId6"/>
-    <p:sldId id="261" r:id="rId7"/>
-    <p:sldId id="262" r:id="rId8"/>
-    <p:sldId id="263" r:id="rId9"/>
+    <p:sldId id="273" r:id="rId3"/>
+    <p:sldId id="257" r:id="rId4"/>
+    <p:sldId id="260" r:id="rId5"/>
+    <p:sldId id="267" r:id="rId6"/>
+    <p:sldId id="269" r:id="rId7"/>
+    <p:sldId id="270" r:id="rId8"/>
+    <p:sldId id="266" r:id="rId9"/>
+    <p:sldId id="275" r:id="rId10"/>
+    <p:sldId id="274" r:id="rId11"/>
+    <p:sldId id="261" r:id="rId12"/>
+    <p:sldId id="264" r:id="rId13"/>
+    <p:sldId id="265" r:id="rId14"/>
+    <p:sldId id="272" r:id="rId15"/>
+    <p:sldId id="276" r:id="rId16"/>
   </p:sldIdLst>
   <p:sldSz cx="12192000" cy="6858000"/>
   <p:notesSz cx="6858000" cy="9144000"/>
@@ -111,7 +121,810 @@
       </a:defRPr>
     </a:lvl9pPr>
   </p:defaultTextStyle>
+  <p:extLst>
+    <p:ext uri="{EFAFB233-063F-42B5-8137-9DF3F51BA10A}">
+      <p15:sldGuideLst xmlns:p15="http://schemas.microsoft.com/office/powerpoint/2012/main"/>
+    </p:ext>
+  </p:extLst>
 </p:presentation>
+</file>
+
+<file path=ppt/notesMasters/notesMaster1.xml><?xml version="1.0" encoding="utf-8"?>
+<p:notesMaster xmlns:a="http://schemas.openxmlformats.org/drawingml/2006/main" xmlns:r="http://schemas.openxmlformats.org/officeDocument/2006/relationships" xmlns:p="http://schemas.openxmlformats.org/presentationml/2006/main">
+  <p:cSld>
+    <p:bg>
+      <p:bgRef idx="1001">
+        <a:schemeClr val="bg1"/>
+      </p:bgRef>
+    </p:bg>
+    <p:spTree>
+      <p:nvGrpSpPr>
+        <p:cNvPr id="1" name=""/>
+        <p:cNvGrpSpPr/>
+        <p:nvPr/>
+      </p:nvGrpSpPr>
+      <p:grpSpPr>
+        <a:xfrm>
+          <a:off x="0" y="0"/>
+          <a:ext cx="0" cy="0"/>
+          <a:chOff x="0" y="0"/>
+          <a:chExt cx="0" cy="0"/>
+        </a:xfrm>
+      </p:grpSpPr>
+      <p:sp>
+        <p:nvSpPr>
+          <p:cNvPr id="2" name="Header Placeholder 1"/>
+          <p:cNvSpPr>
+            <a:spLocks noGrp="1"/>
+          </p:cNvSpPr>
+          <p:nvPr>
+            <p:ph type="hdr" sz="quarter"/>
+          </p:nvPr>
+        </p:nvSpPr>
+        <p:spPr>
+          <a:xfrm>
+            <a:off x="0" y="0"/>
+            <a:ext cx="2971800" cy="458788"/>
+          </a:xfrm>
+          <a:prstGeom prst="rect">
+            <a:avLst/>
+          </a:prstGeom>
+        </p:spPr>
+        <p:txBody>
+          <a:bodyPr vert="horz" lIns="91440" tIns="45720" rIns="91440" bIns="45720" rtlCol="0"/>
+          <a:lstStyle>
+            <a:lvl1pPr algn="l">
+              <a:defRPr sz="1200"/>
+            </a:lvl1pPr>
+          </a:lstStyle>
+          <a:p>
+            <a:endParaRPr lang="en-US"/>
+          </a:p>
+        </p:txBody>
+      </p:sp>
+      <p:sp>
+        <p:nvSpPr>
+          <p:cNvPr id="3" name="Date Placeholder 2"/>
+          <p:cNvSpPr>
+            <a:spLocks noGrp="1"/>
+          </p:cNvSpPr>
+          <p:nvPr>
+            <p:ph type="dt" idx="1"/>
+          </p:nvPr>
+        </p:nvSpPr>
+        <p:spPr>
+          <a:xfrm>
+            <a:off x="3884613" y="0"/>
+            <a:ext cx="2971800" cy="458788"/>
+          </a:xfrm>
+          <a:prstGeom prst="rect">
+            <a:avLst/>
+          </a:prstGeom>
+        </p:spPr>
+        <p:txBody>
+          <a:bodyPr vert="horz" lIns="91440" tIns="45720" rIns="91440" bIns="45720" rtlCol="0"/>
+          <a:lstStyle>
+            <a:lvl1pPr algn="r">
+              <a:defRPr sz="1200"/>
+            </a:lvl1pPr>
+          </a:lstStyle>
+          <a:p>
+            <a:fld id="{C19A411F-6718-8940-A5BA-906DAACF0FB8}" type="datetimeFigureOut">
+              <a:rPr lang="en-US" smtClean="0"/>
+              <a:t>5/9/24</a:t>
+            </a:fld>
+            <a:endParaRPr lang="en-US"/>
+          </a:p>
+        </p:txBody>
+      </p:sp>
+      <p:sp>
+        <p:nvSpPr>
+          <p:cNvPr id="4" name="Slide Image Placeholder 3"/>
+          <p:cNvSpPr>
+            <a:spLocks noGrp="1" noRot="1" noChangeAspect="1"/>
+          </p:cNvSpPr>
+          <p:nvPr>
+            <p:ph type="sldImg" idx="2"/>
+          </p:nvPr>
+        </p:nvSpPr>
+        <p:spPr>
+          <a:xfrm>
+            <a:off x="685800" y="1143000"/>
+            <a:ext cx="5486400" cy="3086100"/>
+          </a:xfrm>
+          <a:prstGeom prst="rect">
+            <a:avLst/>
+          </a:prstGeom>
+          <a:noFill/>
+          <a:ln w="12700">
+            <a:solidFill>
+              <a:prstClr val="black"/>
+            </a:solidFill>
+          </a:ln>
+        </p:spPr>
+        <p:txBody>
+          <a:bodyPr vert="horz" lIns="91440" tIns="45720" rIns="91440" bIns="45720" rtlCol="0" anchor="ctr"/>
+          <a:lstStyle/>
+          <a:p>
+            <a:endParaRPr lang="en-US"/>
+          </a:p>
+        </p:txBody>
+      </p:sp>
+      <p:sp>
+        <p:nvSpPr>
+          <p:cNvPr id="5" name="Notes Placeholder 4"/>
+          <p:cNvSpPr>
+            <a:spLocks noGrp="1"/>
+          </p:cNvSpPr>
+          <p:nvPr>
+            <p:ph type="body" sz="quarter" idx="3"/>
+          </p:nvPr>
+        </p:nvSpPr>
+        <p:spPr>
+          <a:xfrm>
+            <a:off x="685800" y="4400550"/>
+            <a:ext cx="5486400" cy="3600450"/>
+          </a:xfrm>
+          <a:prstGeom prst="rect">
+            <a:avLst/>
+          </a:prstGeom>
+        </p:spPr>
+        <p:txBody>
+          <a:bodyPr vert="horz" lIns="91440" tIns="45720" rIns="91440" bIns="45720" rtlCol="0"/>
+          <a:lstStyle/>
+          <a:p>
+            <a:pPr lvl="0"/>
+            <a:r>
+              <a:rPr lang="en-GB"/>
+              <a:t>Click to edit Master text styles</a:t>
+            </a:r>
+          </a:p>
+          <a:p>
+            <a:pPr lvl="1"/>
+            <a:r>
+              <a:rPr lang="en-GB"/>
+              <a:t>Second level</a:t>
+            </a:r>
+          </a:p>
+          <a:p>
+            <a:pPr lvl="2"/>
+            <a:r>
+              <a:rPr lang="en-GB"/>
+              <a:t>Third level</a:t>
+            </a:r>
+          </a:p>
+          <a:p>
+            <a:pPr lvl="3"/>
+            <a:r>
+              <a:rPr lang="en-GB"/>
+              <a:t>Fourth level</a:t>
+            </a:r>
+          </a:p>
+          <a:p>
+            <a:pPr lvl="4"/>
+            <a:r>
+              <a:rPr lang="en-GB"/>
+              <a:t>Fifth level</a:t>
+            </a:r>
+            <a:endParaRPr lang="en-US"/>
+          </a:p>
+        </p:txBody>
+      </p:sp>
+      <p:sp>
+        <p:nvSpPr>
+          <p:cNvPr id="6" name="Footer Placeholder 5"/>
+          <p:cNvSpPr>
+            <a:spLocks noGrp="1"/>
+          </p:cNvSpPr>
+          <p:nvPr>
+            <p:ph type="ftr" sz="quarter" idx="4"/>
+          </p:nvPr>
+        </p:nvSpPr>
+        <p:spPr>
+          <a:xfrm>
+            <a:off x="0" y="8685213"/>
+            <a:ext cx="2971800" cy="458787"/>
+          </a:xfrm>
+          <a:prstGeom prst="rect">
+            <a:avLst/>
+          </a:prstGeom>
+        </p:spPr>
+        <p:txBody>
+          <a:bodyPr vert="horz" lIns="91440" tIns="45720" rIns="91440" bIns="45720" rtlCol="0" anchor="b"/>
+          <a:lstStyle>
+            <a:lvl1pPr algn="l">
+              <a:defRPr sz="1200"/>
+            </a:lvl1pPr>
+          </a:lstStyle>
+          <a:p>
+            <a:endParaRPr lang="en-US"/>
+          </a:p>
+        </p:txBody>
+      </p:sp>
+      <p:sp>
+        <p:nvSpPr>
+          <p:cNvPr id="7" name="Slide Number Placeholder 6"/>
+          <p:cNvSpPr>
+            <a:spLocks noGrp="1"/>
+          </p:cNvSpPr>
+          <p:nvPr>
+            <p:ph type="sldNum" sz="quarter" idx="5"/>
+          </p:nvPr>
+        </p:nvSpPr>
+        <p:spPr>
+          <a:xfrm>
+            <a:off x="3884613" y="8685213"/>
+            <a:ext cx="2971800" cy="458787"/>
+          </a:xfrm>
+          <a:prstGeom prst="rect">
+            <a:avLst/>
+          </a:prstGeom>
+        </p:spPr>
+        <p:txBody>
+          <a:bodyPr vert="horz" lIns="91440" tIns="45720" rIns="91440" bIns="45720" rtlCol="0" anchor="b"/>
+          <a:lstStyle>
+            <a:lvl1pPr algn="r">
+              <a:defRPr sz="1200"/>
+            </a:lvl1pPr>
+          </a:lstStyle>
+          <a:p>
+            <a:fld id="{CBE65A27-7914-FA42-81AB-9E4CA10FDF60}" type="slidenum">
+              <a:rPr lang="en-US" smtClean="0"/>
+              <a:t>‹#›</a:t>
+            </a:fld>
+            <a:endParaRPr lang="en-US"/>
+          </a:p>
+        </p:txBody>
+      </p:sp>
+    </p:spTree>
+    <p:extLst>
+      <p:ext uri="{BB962C8B-B14F-4D97-AF65-F5344CB8AC3E}">
+        <p14:creationId xmlns:p14="http://schemas.microsoft.com/office/powerpoint/2010/main" val="186872305"/>
+      </p:ext>
+    </p:extLst>
+  </p:cSld>
+  <p:clrMap bg1="lt1" tx1="dk1" bg2="lt2" tx2="dk2" accent1="accent1" accent2="accent2" accent3="accent3" accent4="accent4" accent5="accent5" accent6="accent6" hlink="hlink" folHlink="folHlink"/>
+  <p:notesStyle>
+    <a:lvl1pPr marL="0" algn="l" defTabSz="914400" rtl="0" eaLnBrk="1" latinLnBrk="0" hangingPunct="1">
+      <a:defRPr sz="1200" kern="1200">
+        <a:solidFill>
+          <a:schemeClr val="tx1"/>
+        </a:solidFill>
+        <a:latin typeface="+mn-lt"/>
+        <a:ea typeface="+mn-ea"/>
+        <a:cs typeface="+mn-cs"/>
+      </a:defRPr>
+    </a:lvl1pPr>
+    <a:lvl2pPr marL="457200" algn="l" defTabSz="914400" rtl="0" eaLnBrk="1" latinLnBrk="0" hangingPunct="1">
+      <a:defRPr sz="1200" kern="1200">
+        <a:solidFill>
+          <a:schemeClr val="tx1"/>
+        </a:solidFill>
+        <a:latin typeface="+mn-lt"/>
+        <a:ea typeface="+mn-ea"/>
+        <a:cs typeface="+mn-cs"/>
+      </a:defRPr>
+    </a:lvl2pPr>
+    <a:lvl3pPr marL="914400" algn="l" defTabSz="914400" rtl="0" eaLnBrk="1" latinLnBrk="0" hangingPunct="1">
+      <a:defRPr sz="1200" kern="1200">
+        <a:solidFill>
+          <a:schemeClr val="tx1"/>
+        </a:solidFill>
+        <a:latin typeface="+mn-lt"/>
+        <a:ea typeface="+mn-ea"/>
+        <a:cs typeface="+mn-cs"/>
+      </a:defRPr>
+    </a:lvl3pPr>
+    <a:lvl4pPr marL="1371600" algn="l" defTabSz="914400" rtl="0" eaLnBrk="1" latinLnBrk="0" hangingPunct="1">
+      <a:defRPr sz="1200" kern="1200">
+        <a:solidFill>
+          <a:schemeClr val="tx1"/>
+        </a:solidFill>
+        <a:latin typeface="+mn-lt"/>
+        <a:ea typeface="+mn-ea"/>
+        <a:cs typeface="+mn-cs"/>
+      </a:defRPr>
+    </a:lvl4pPr>
+    <a:lvl5pPr marL="1828800" algn="l" defTabSz="914400" rtl="0" eaLnBrk="1" latinLnBrk="0" hangingPunct="1">
+      <a:defRPr sz="1200" kern="1200">
+        <a:solidFill>
+          <a:schemeClr val="tx1"/>
+        </a:solidFill>
+        <a:latin typeface="+mn-lt"/>
+        <a:ea typeface="+mn-ea"/>
+        <a:cs typeface="+mn-cs"/>
+      </a:defRPr>
+    </a:lvl5pPr>
+    <a:lvl6pPr marL="2286000" algn="l" defTabSz="914400" rtl="0" eaLnBrk="1" latinLnBrk="0" hangingPunct="1">
+      <a:defRPr sz="1200" kern="1200">
+        <a:solidFill>
+          <a:schemeClr val="tx1"/>
+        </a:solidFill>
+        <a:latin typeface="+mn-lt"/>
+        <a:ea typeface="+mn-ea"/>
+        <a:cs typeface="+mn-cs"/>
+      </a:defRPr>
+    </a:lvl6pPr>
+    <a:lvl7pPr marL="2743200" algn="l" defTabSz="914400" rtl="0" eaLnBrk="1" latinLnBrk="0" hangingPunct="1">
+      <a:defRPr sz="1200" kern="1200">
+        <a:solidFill>
+          <a:schemeClr val="tx1"/>
+        </a:solidFill>
+        <a:latin typeface="+mn-lt"/>
+        <a:ea typeface="+mn-ea"/>
+        <a:cs typeface="+mn-cs"/>
+      </a:defRPr>
+    </a:lvl7pPr>
+    <a:lvl8pPr marL="3200400" algn="l" defTabSz="914400" rtl="0" eaLnBrk="1" latinLnBrk="0" hangingPunct="1">
+      <a:defRPr sz="1200" kern="1200">
+        <a:solidFill>
+          <a:schemeClr val="tx1"/>
+        </a:solidFill>
+        <a:latin typeface="+mn-lt"/>
+        <a:ea typeface="+mn-ea"/>
+        <a:cs typeface="+mn-cs"/>
+      </a:defRPr>
+    </a:lvl8pPr>
+    <a:lvl9pPr marL="3657600" algn="l" defTabSz="914400" rtl="0" eaLnBrk="1" latinLnBrk="0" hangingPunct="1">
+      <a:defRPr sz="1200" kern="1200">
+        <a:solidFill>
+          <a:schemeClr val="tx1"/>
+        </a:solidFill>
+        <a:latin typeface="+mn-lt"/>
+        <a:ea typeface="+mn-ea"/>
+        <a:cs typeface="+mn-cs"/>
+      </a:defRPr>
+    </a:lvl9pPr>
+  </p:notesStyle>
+</p:notesMaster>
+</file>
+
+<file path=ppt/notesSlides/notesSlide1.xml><?xml version="1.0" encoding="utf-8"?>
+<p:notes xmlns:a="http://schemas.openxmlformats.org/drawingml/2006/main" xmlns:r="http://schemas.openxmlformats.org/officeDocument/2006/relationships" xmlns:p="http://schemas.openxmlformats.org/presentationml/2006/main">
+  <p:cSld>
+    <p:spTree>
+      <p:nvGrpSpPr>
+        <p:cNvPr id="1" name=""/>
+        <p:cNvGrpSpPr/>
+        <p:nvPr/>
+      </p:nvGrpSpPr>
+      <p:grpSpPr>
+        <a:xfrm>
+          <a:off x="0" y="0"/>
+          <a:ext cx="0" cy="0"/>
+          <a:chOff x="0" y="0"/>
+          <a:chExt cx="0" cy="0"/>
+        </a:xfrm>
+      </p:grpSpPr>
+      <p:sp>
+        <p:nvSpPr>
+          <p:cNvPr id="2" name="Slide Image Placeholder 1"/>
+          <p:cNvSpPr>
+            <a:spLocks noGrp="1" noRot="1" noChangeAspect="1"/>
+          </p:cNvSpPr>
+          <p:nvPr>
+            <p:ph type="sldImg"/>
+          </p:nvPr>
+        </p:nvSpPr>
+        <p:spPr/>
+      </p:sp>
+      <p:sp>
+        <p:nvSpPr>
+          <p:cNvPr id="3" name="Notes Placeholder 2"/>
+          <p:cNvSpPr>
+            <a:spLocks noGrp="1"/>
+          </p:cNvSpPr>
+          <p:nvPr>
+            <p:ph type="body" idx="1"/>
+          </p:nvPr>
+        </p:nvSpPr>
+        <p:spPr/>
+        <p:txBody>
+          <a:bodyPr/>
+          <a:lstStyle/>
+          <a:p>
+            <a:r>
+              <a:rPr lang="en-US" dirty="0"/>
+              <a:t>Mention:</a:t>
+            </a:r>
+          </a:p>
+          <a:p>
+            <a:endParaRPr lang="en-US" dirty="0"/>
+          </a:p>
+          <a:p>
+            <a:r>
+              <a:rPr lang="en-US" dirty="0"/>
+              <a:t>Multicore design</a:t>
+            </a:r>
+          </a:p>
+          <a:p>
+            <a:r>
+              <a:rPr lang="en-US" dirty="0"/>
+              <a:t>Explain the purpose of each core</a:t>
+            </a:r>
+          </a:p>
+          <a:p>
+            <a:r>
+              <a:rPr lang="en-US" dirty="0"/>
+              <a:t>Mention core 1’s closeness to ethernet MAC and the AES engine</a:t>
+            </a:r>
+          </a:p>
+          <a:p>
+            <a:endParaRPr lang="en-US" dirty="0"/>
+          </a:p>
+        </p:txBody>
+      </p:sp>
+      <p:sp>
+        <p:nvSpPr>
+          <p:cNvPr id="4" name="Slide Number Placeholder 3"/>
+          <p:cNvSpPr>
+            <a:spLocks noGrp="1"/>
+          </p:cNvSpPr>
+          <p:nvPr>
+            <p:ph type="sldNum" sz="quarter" idx="5"/>
+          </p:nvPr>
+        </p:nvSpPr>
+        <p:spPr/>
+        <p:txBody>
+          <a:bodyPr/>
+          <a:lstStyle/>
+          <a:p>
+            <a:fld id="{CBE65A27-7914-FA42-81AB-9E4CA10FDF60}" type="slidenum">
+              <a:rPr lang="en-US" smtClean="0"/>
+              <a:t>5</a:t>
+            </a:fld>
+            <a:endParaRPr lang="en-US"/>
+          </a:p>
+        </p:txBody>
+      </p:sp>
+    </p:spTree>
+    <p:extLst>
+      <p:ext uri="{BB962C8B-B14F-4D97-AF65-F5344CB8AC3E}">
+        <p14:creationId xmlns:p14="http://schemas.microsoft.com/office/powerpoint/2010/main" val="811284000"/>
+      </p:ext>
+    </p:extLst>
+  </p:cSld>
+  <p:clrMapOvr>
+    <a:masterClrMapping/>
+  </p:clrMapOvr>
+</p:notes>
+</file>
+
+<file path=ppt/notesSlides/notesSlide2.xml><?xml version="1.0" encoding="utf-8"?>
+<p:notes xmlns:a="http://schemas.openxmlformats.org/drawingml/2006/main" xmlns:r="http://schemas.openxmlformats.org/officeDocument/2006/relationships" xmlns:p="http://schemas.openxmlformats.org/presentationml/2006/main">
+  <p:cSld>
+    <p:spTree>
+      <p:nvGrpSpPr>
+        <p:cNvPr id="1" name=""/>
+        <p:cNvGrpSpPr/>
+        <p:nvPr/>
+      </p:nvGrpSpPr>
+      <p:grpSpPr>
+        <a:xfrm>
+          <a:off x="0" y="0"/>
+          <a:ext cx="0" cy="0"/>
+          <a:chOff x="0" y="0"/>
+          <a:chExt cx="0" cy="0"/>
+        </a:xfrm>
+      </p:grpSpPr>
+      <p:sp>
+        <p:nvSpPr>
+          <p:cNvPr id="2" name="Slide Image Placeholder 1"/>
+          <p:cNvSpPr>
+            <a:spLocks noGrp="1" noRot="1" noChangeAspect="1"/>
+          </p:cNvSpPr>
+          <p:nvPr>
+            <p:ph type="sldImg"/>
+          </p:nvPr>
+        </p:nvSpPr>
+        <p:spPr/>
+      </p:sp>
+      <p:sp>
+        <p:nvSpPr>
+          <p:cNvPr id="3" name="Notes Placeholder 2"/>
+          <p:cNvSpPr>
+            <a:spLocks noGrp="1"/>
+          </p:cNvSpPr>
+          <p:nvPr>
+            <p:ph type="body" idx="1"/>
+          </p:nvPr>
+        </p:nvSpPr>
+        <p:spPr/>
+        <p:txBody>
+          <a:bodyPr/>
+          <a:lstStyle/>
+          <a:p>
+            <a:r>
+              <a:rPr lang="en-US" dirty="0"/>
+              <a:t>Mention:</a:t>
+            </a:r>
+          </a:p>
+          <a:p>
+            <a:r>
+              <a:rPr lang="en-US" dirty="0" err="1"/>
+              <a:t>SpinalHDL</a:t>
+            </a:r>
+            <a:r>
+              <a:rPr lang="en-US" dirty="0"/>
+              <a:t> for programming, built on top of </a:t>
+            </a:r>
+            <a:r>
+              <a:rPr lang="en-US" dirty="0" err="1"/>
+              <a:t>scala</a:t>
+            </a:r>
+            <a:r>
+              <a:rPr lang="en-US" dirty="0"/>
+              <a:t> built tools, Vexriscv-32 is built with it</a:t>
+            </a:r>
+          </a:p>
+          <a:p>
+            <a:r>
+              <a:rPr lang="en-US" dirty="0" err="1"/>
+              <a:t>LiteX</a:t>
+            </a:r>
+            <a:r>
+              <a:rPr lang="en-US" dirty="0"/>
+              <a:t> for building SOCs</a:t>
+            </a:r>
+          </a:p>
+          <a:p>
+            <a:endParaRPr lang="en-US" dirty="0"/>
+          </a:p>
+          <a:p>
+            <a:r>
+              <a:rPr lang="en-US" dirty="0"/>
+              <a:t>100MHz in literature</a:t>
+            </a:r>
+          </a:p>
+        </p:txBody>
+      </p:sp>
+      <p:sp>
+        <p:nvSpPr>
+          <p:cNvPr id="4" name="Slide Number Placeholder 3"/>
+          <p:cNvSpPr>
+            <a:spLocks noGrp="1"/>
+          </p:cNvSpPr>
+          <p:nvPr>
+            <p:ph type="sldNum" sz="quarter" idx="5"/>
+          </p:nvPr>
+        </p:nvSpPr>
+        <p:spPr/>
+        <p:txBody>
+          <a:bodyPr/>
+          <a:lstStyle/>
+          <a:p>
+            <a:fld id="{CBE65A27-7914-FA42-81AB-9E4CA10FDF60}" type="slidenum">
+              <a:rPr lang="en-US" smtClean="0"/>
+              <a:t>6</a:t>
+            </a:fld>
+            <a:endParaRPr lang="en-US"/>
+          </a:p>
+        </p:txBody>
+      </p:sp>
+    </p:spTree>
+    <p:extLst>
+      <p:ext uri="{BB962C8B-B14F-4D97-AF65-F5344CB8AC3E}">
+        <p14:creationId xmlns:p14="http://schemas.microsoft.com/office/powerpoint/2010/main" val="2499647774"/>
+      </p:ext>
+    </p:extLst>
+  </p:cSld>
+  <p:clrMapOvr>
+    <a:masterClrMapping/>
+  </p:clrMapOvr>
+</p:notes>
+</file>
+
+<file path=ppt/notesSlides/notesSlide3.xml><?xml version="1.0" encoding="utf-8"?>
+<p:notes xmlns:a="http://schemas.openxmlformats.org/drawingml/2006/main" xmlns:r="http://schemas.openxmlformats.org/officeDocument/2006/relationships" xmlns:p="http://schemas.openxmlformats.org/presentationml/2006/main">
+  <p:cSld>
+    <p:spTree>
+      <p:nvGrpSpPr>
+        <p:cNvPr id="1" name=""/>
+        <p:cNvGrpSpPr/>
+        <p:nvPr/>
+      </p:nvGrpSpPr>
+      <p:grpSpPr>
+        <a:xfrm>
+          <a:off x="0" y="0"/>
+          <a:ext cx="0" cy="0"/>
+          <a:chOff x="0" y="0"/>
+          <a:chExt cx="0" cy="0"/>
+        </a:xfrm>
+      </p:grpSpPr>
+      <p:sp>
+        <p:nvSpPr>
+          <p:cNvPr id="2" name="Slide Image Placeholder 1"/>
+          <p:cNvSpPr>
+            <a:spLocks noGrp="1" noRot="1" noChangeAspect="1"/>
+          </p:cNvSpPr>
+          <p:nvPr>
+            <p:ph type="sldImg"/>
+          </p:nvPr>
+        </p:nvSpPr>
+        <p:spPr/>
+      </p:sp>
+      <p:sp>
+        <p:nvSpPr>
+          <p:cNvPr id="3" name="Notes Placeholder 2"/>
+          <p:cNvSpPr>
+            <a:spLocks noGrp="1"/>
+          </p:cNvSpPr>
+          <p:nvPr>
+            <p:ph type="body" idx="1"/>
+          </p:nvPr>
+        </p:nvSpPr>
+        <p:spPr/>
+        <p:txBody>
+          <a:bodyPr/>
+          <a:lstStyle/>
+          <a:p>
+            <a:endParaRPr lang="en-US" dirty="0"/>
+          </a:p>
+        </p:txBody>
+      </p:sp>
+      <p:sp>
+        <p:nvSpPr>
+          <p:cNvPr id="4" name="Slide Number Placeholder 3"/>
+          <p:cNvSpPr>
+            <a:spLocks noGrp="1"/>
+          </p:cNvSpPr>
+          <p:nvPr>
+            <p:ph type="sldNum" sz="quarter" idx="5"/>
+          </p:nvPr>
+        </p:nvSpPr>
+        <p:spPr/>
+        <p:txBody>
+          <a:bodyPr/>
+          <a:lstStyle/>
+          <a:p>
+            <a:fld id="{CBE65A27-7914-FA42-81AB-9E4CA10FDF60}" type="slidenum">
+              <a:rPr lang="en-US" smtClean="0"/>
+              <a:t>11</a:t>
+            </a:fld>
+            <a:endParaRPr lang="en-US"/>
+          </a:p>
+        </p:txBody>
+      </p:sp>
+    </p:spTree>
+    <p:extLst>
+      <p:ext uri="{BB962C8B-B14F-4D97-AF65-F5344CB8AC3E}">
+        <p14:creationId xmlns:p14="http://schemas.microsoft.com/office/powerpoint/2010/main" val="3376385017"/>
+      </p:ext>
+    </p:extLst>
+  </p:cSld>
+  <p:clrMapOvr>
+    <a:masterClrMapping/>
+  </p:clrMapOvr>
+</p:notes>
+</file>
+
+<file path=ppt/notesSlides/notesSlide4.xml><?xml version="1.0" encoding="utf-8"?>
+<p:notes xmlns:a="http://schemas.openxmlformats.org/drawingml/2006/main" xmlns:r="http://schemas.openxmlformats.org/officeDocument/2006/relationships" xmlns:p="http://schemas.openxmlformats.org/presentationml/2006/main">
+  <p:cSld>
+    <p:spTree>
+      <p:nvGrpSpPr>
+        <p:cNvPr id="1" name=""/>
+        <p:cNvGrpSpPr/>
+        <p:nvPr/>
+      </p:nvGrpSpPr>
+      <p:grpSpPr>
+        <a:xfrm>
+          <a:off x="0" y="0"/>
+          <a:ext cx="0" cy="0"/>
+          <a:chOff x="0" y="0"/>
+          <a:chExt cx="0" cy="0"/>
+        </a:xfrm>
+      </p:grpSpPr>
+      <p:sp>
+        <p:nvSpPr>
+          <p:cNvPr id="2" name="Slide Image Placeholder 1"/>
+          <p:cNvSpPr>
+            <a:spLocks noGrp="1" noRot="1" noChangeAspect="1"/>
+          </p:cNvSpPr>
+          <p:nvPr>
+            <p:ph type="sldImg"/>
+          </p:nvPr>
+        </p:nvSpPr>
+        <p:spPr/>
+      </p:sp>
+      <p:sp>
+        <p:nvSpPr>
+          <p:cNvPr id="3" name="Notes Placeholder 2"/>
+          <p:cNvSpPr>
+            <a:spLocks noGrp="1"/>
+          </p:cNvSpPr>
+          <p:nvPr>
+            <p:ph type="body" idx="1"/>
+          </p:nvPr>
+        </p:nvSpPr>
+        <p:spPr/>
+        <p:txBody>
+          <a:bodyPr/>
+          <a:lstStyle/>
+          <a:p>
+            <a:r>
+              <a:rPr lang="en-US" dirty="0"/>
+              <a:t>The test bed is done (but only virtually)</a:t>
+            </a:r>
+          </a:p>
+          <a:p>
+            <a:r>
+              <a:rPr lang="en-US" dirty="0"/>
+              <a:t>Containers and deployment services defined</a:t>
+            </a:r>
+          </a:p>
+          <a:p>
+            <a:r>
+              <a:rPr lang="en-US" dirty="0"/>
+              <a:t>Container that mimics the SCPNS</a:t>
+            </a:r>
+          </a:p>
+          <a:p>
+            <a:r>
+              <a:rPr lang="en-US" dirty="0"/>
+              <a:t>Container for clients</a:t>
+            </a:r>
+          </a:p>
+          <a:p>
+            <a:pPr marL="0" indent="0">
+              <a:buNone/>
+            </a:pPr>
+            <a:endParaRPr lang="en-US" dirty="0"/>
+          </a:p>
+          <a:p>
+            <a:pPr marL="0" indent="0">
+              <a:buNone/>
+            </a:pPr>
+            <a:r>
+              <a:rPr lang="en-US" dirty="0"/>
+              <a:t>However, …</a:t>
+            </a:r>
+          </a:p>
+          <a:p>
+            <a:r>
+              <a:rPr lang="en-US" dirty="0"/>
+              <a:t>It still needs to run on the cluster network hardware</a:t>
+            </a:r>
+          </a:p>
+          <a:p>
+            <a:endParaRPr lang="en-US" dirty="0"/>
+          </a:p>
+        </p:txBody>
+      </p:sp>
+      <p:sp>
+        <p:nvSpPr>
+          <p:cNvPr id="4" name="Slide Number Placeholder 3"/>
+          <p:cNvSpPr>
+            <a:spLocks noGrp="1"/>
+          </p:cNvSpPr>
+          <p:nvPr>
+            <p:ph type="sldNum" sz="quarter" idx="5"/>
+          </p:nvPr>
+        </p:nvSpPr>
+        <p:spPr/>
+        <p:txBody>
+          <a:bodyPr/>
+          <a:lstStyle/>
+          <a:p>
+            <a:fld id="{CBE65A27-7914-FA42-81AB-9E4CA10FDF60}" type="slidenum">
+              <a:rPr lang="en-US" smtClean="0"/>
+              <a:t>14</a:t>
+            </a:fld>
+            <a:endParaRPr lang="en-US"/>
+          </a:p>
+        </p:txBody>
+      </p:sp>
+    </p:spTree>
+    <p:extLst>
+      <p:ext uri="{BB962C8B-B14F-4D97-AF65-F5344CB8AC3E}">
+        <p14:creationId xmlns:p14="http://schemas.microsoft.com/office/powerpoint/2010/main" val="3168284879"/>
+      </p:ext>
+    </p:extLst>
+  </p:cSld>
+  <p:clrMapOvr>
+    <a:masterClrMapping/>
+  </p:clrMapOvr>
+</p:notes>
 </file>
 
 <file path=ppt/slideLayouts/slideLayout1.xml><?xml version="1.0" encoding="utf-8"?>
@@ -261,9 +1074,9 @@
           <a:bodyPr/>
           <a:lstStyle/>
           <a:p>
-            <a:fld id="{6DCC89E6-C62B-E14C-9CA0-F14A3DAEE564}" type="datetimeFigureOut">
-              <a:rPr lang="en-US" smtClean="0"/>
-              <a:t>5/4/24</a:t>
+            <a:fld id="{C7C4BD3D-E203-5D44-A508-351E3EF900B5}" type="datetime1">
+              <a:rPr lang="en-AU" smtClean="0"/>
+              <a:t>9/5/2024</a:t>
             </a:fld>
             <a:endParaRPr lang="en-US"/>
           </a:p>
@@ -461,9 +1274,9 @@
           <a:bodyPr/>
           <a:lstStyle/>
           <a:p>
-            <a:fld id="{6DCC89E6-C62B-E14C-9CA0-F14A3DAEE564}" type="datetimeFigureOut">
-              <a:rPr lang="en-US" smtClean="0"/>
-              <a:t>5/4/24</a:t>
+            <a:fld id="{35445353-5C45-434D-87E7-C7B7DAF54242}" type="datetime1">
+              <a:rPr lang="en-AU" smtClean="0"/>
+              <a:t>9/5/2024</a:t>
             </a:fld>
             <a:endParaRPr lang="en-US"/>
           </a:p>
@@ -671,9 +1484,9 @@
           <a:bodyPr/>
           <a:lstStyle/>
           <a:p>
-            <a:fld id="{6DCC89E6-C62B-E14C-9CA0-F14A3DAEE564}" type="datetimeFigureOut">
-              <a:rPr lang="en-US" smtClean="0"/>
-              <a:t>5/4/24</a:t>
+            <a:fld id="{A07AC633-6883-D940-AA2E-A903F36928B1}" type="datetime1">
+              <a:rPr lang="en-AU" smtClean="0"/>
+              <a:t>9/5/2024</a:t>
             </a:fld>
             <a:endParaRPr lang="en-US"/>
           </a:p>
@@ -871,9 +1684,9 @@
           <a:bodyPr/>
           <a:lstStyle/>
           <a:p>
-            <a:fld id="{6DCC89E6-C62B-E14C-9CA0-F14A3DAEE564}" type="datetimeFigureOut">
-              <a:rPr lang="en-US" smtClean="0"/>
-              <a:t>5/4/24</a:t>
+            <a:fld id="{EFD93542-FA30-5448-8531-1B8AEE3BC3EC}" type="datetime1">
+              <a:rPr lang="en-AU" smtClean="0"/>
+              <a:t>9/5/2024</a:t>
             </a:fld>
             <a:endParaRPr lang="en-US"/>
           </a:p>
@@ -1147,9 +1960,9 @@
           <a:bodyPr/>
           <a:lstStyle/>
           <a:p>
-            <a:fld id="{6DCC89E6-C62B-E14C-9CA0-F14A3DAEE564}" type="datetimeFigureOut">
-              <a:rPr lang="en-US" smtClean="0"/>
-              <a:t>5/4/24</a:t>
+            <a:fld id="{BD86D4E0-F624-6C4C-BFF9-68FB7341F338}" type="datetime1">
+              <a:rPr lang="en-AU" smtClean="0"/>
+              <a:t>9/5/2024</a:t>
             </a:fld>
             <a:endParaRPr lang="en-US"/>
           </a:p>
@@ -1415,9 +2228,9 @@
           <a:bodyPr/>
           <a:lstStyle/>
           <a:p>
-            <a:fld id="{6DCC89E6-C62B-E14C-9CA0-F14A3DAEE564}" type="datetimeFigureOut">
-              <a:rPr lang="en-US" smtClean="0"/>
-              <a:t>5/4/24</a:t>
+            <a:fld id="{66FC7B16-93C6-C342-B5D6-ADEC457C6417}" type="datetime1">
+              <a:rPr lang="en-AU" smtClean="0"/>
+              <a:t>9/5/2024</a:t>
             </a:fld>
             <a:endParaRPr lang="en-US"/>
           </a:p>
@@ -1830,9 +2643,9 @@
           <a:bodyPr/>
           <a:lstStyle/>
           <a:p>
-            <a:fld id="{6DCC89E6-C62B-E14C-9CA0-F14A3DAEE564}" type="datetimeFigureOut">
-              <a:rPr lang="en-US" smtClean="0"/>
-              <a:t>5/4/24</a:t>
+            <a:fld id="{E5544B85-F832-E947-AA0F-F5E2B97EF92C}" type="datetime1">
+              <a:rPr lang="en-AU" smtClean="0"/>
+              <a:t>9/5/2024</a:t>
             </a:fld>
             <a:endParaRPr lang="en-US"/>
           </a:p>
@@ -1972,9 +2785,9 @@
           <a:bodyPr/>
           <a:lstStyle/>
           <a:p>
-            <a:fld id="{6DCC89E6-C62B-E14C-9CA0-F14A3DAEE564}" type="datetimeFigureOut">
-              <a:rPr lang="en-US" smtClean="0"/>
-              <a:t>5/4/24</a:t>
+            <a:fld id="{FAF92F2B-07E8-744D-9C00-EA56E47D6ADD}" type="datetime1">
+              <a:rPr lang="en-AU" smtClean="0"/>
+              <a:t>9/5/2024</a:t>
             </a:fld>
             <a:endParaRPr lang="en-US"/>
           </a:p>
@@ -2085,9 +2898,9 @@
           <a:bodyPr/>
           <a:lstStyle/>
           <a:p>
-            <a:fld id="{6DCC89E6-C62B-E14C-9CA0-F14A3DAEE564}" type="datetimeFigureOut">
-              <a:rPr lang="en-US" smtClean="0"/>
-              <a:t>5/4/24</a:t>
+            <a:fld id="{C0ED0872-F6A0-AE46-854D-FE783DE39322}" type="datetime1">
+              <a:rPr lang="en-AU" smtClean="0"/>
+              <a:t>9/5/2024</a:t>
             </a:fld>
             <a:endParaRPr lang="en-US"/>
           </a:p>
@@ -2398,9 +3211,9 @@
           <a:bodyPr/>
           <a:lstStyle/>
           <a:p>
-            <a:fld id="{6DCC89E6-C62B-E14C-9CA0-F14A3DAEE564}" type="datetimeFigureOut">
-              <a:rPr lang="en-US" smtClean="0"/>
-              <a:t>5/4/24</a:t>
+            <a:fld id="{97E5FC54-C244-0C4D-A4B6-2F3B424719E0}" type="datetime1">
+              <a:rPr lang="en-AU" smtClean="0"/>
+              <a:t>9/5/2024</a:t>
             </a:fld>
             <a:endParaRPr lang="en-US"/>
           </a:p>
@@ -2687,9 +3500,9 @@
           <a:bodyPr/>
           <a:lstStyle/>
           <a:p>
-            <a:fld id="{6DCC89E6-C62B-E14C-9CA0-F14A3DAEE564}" type="datetimeFigureOut">
-              <a:rPr lang="en-US" smtClean="0"/>
-              <a:t>5/4/24</a:t>
+            <a:fld id="{D8162ACA-D6C2-2645-AF89-974DADF2BFAC}" type="datetime1">
+              <a:rPr lang="en-AU" smtClean="0"/>
+              <a:t>9/5/2024</a:t>
             </a:fld>
             <a:endParaRPr lang="en-US"/>
           </a:p>
@@ -2930,9 +3743,9 @@
             </a:lvl1pPr>
           </a:lstStyle>
           <a:p>
-            <a:fld id="{6DCC89E6-C62B-E14C-9CA0-F14A3DAEE564}" type="datetimeFigureOut">
-              <a:rPr lang="en-US" smtClean="0"/>
-              <a:t>5/4/24</a:t>
+            <a:fld id="{88474E41-BE8D-BB43-A0CF-D1EE7B9F9767}" type="datetime1">
+              <a:rPr lang="en-AU" smtClean="0"/>
+              <a:t>9/5/2024</a:t>
             </a:fld>
             <a:endParaRPr lang="en-US"/>
           </a:p>
@@ -3049,6 +3862,7 @@
     <p:sldLayoutId id="2147483658" r:id="rId10"/>
     <p:sldLayoutId id="2147483659" r:id="rId11"/>
   </p:sldLayoutIdLst>
+  <p:hf hdr="0" ftr="0" dt="0"/>
   <p:txStyles>
     <p:titleStyle>
       <a:lvl1pPr algn="l" defTabSz="914400" rtl="0" eaLnBrk="1" latinLnBrk="0" hangingPunct="1">
@@ -3417,7 +4231,7 @@
           <p:nvPr>
             <p:extLst>
               <p:ext uri="{D42A27DB-BD31-4B8C-83A1-F6EECF244321}">
-                <p14:modId xmlns:p14="http://schemas.microsoft.com/office/powerpoint/2010/main" val="9328528"/>
+                <p14:modId xmlns:p14="http://schemas.microsoft.com/office/powerpoint/2010/main" val="1286678702"/>
               </p:ext>
             </p:extLst>
           </p:nvPr>
@@ -3507,10 +4321,1624 @@
           </a:graphicData>
         </a:graphic>
       </p:graphicFrame>
+      <p:sp>
+        <p:nvSpPr>
+          <p:cNvPr id="2" name="Slide Number Placeholder 1">
+            <a:extLst>
+              <a:ext uri="{FF2B5EF4-FFF2-40B4-BE49-F238E27FC236}">
+                <a16:creationId xmlns:a16="http://schemas.microsoft.com/office/drawing/2014/main" id="{8700070A-7BDB-4A05-F53D-1F9DC741FE66}"/>
+              </a:ext>
+            </a:extLst>
+          </p:cNvPr>
+          <p:cNvSpPr>
+            <a:spLocks noGrp="1"/>
+          </p:cNvSpPr>
+          <p:nvPr>
+            <p:ph type="sldNum" sz="quarter" idx="12"/>
+          </p:nvPr>
+        </p:nvSpPr>
+        <p:spPr/>
+        <p:txBody>
+          <a:bodyPr/>
+          <a:lstStyle/>
+          <a:p>
+            <a:fld id="{029AB40E-1F3D-A54A-8158-3F2FE1271995}" type="slidenum">
+              <a:rPr lang="en-US" smtClean="0"/>
+              <a:t>1</a:t>
+            </a:fld>
+            <a:endParaRPr lang="en-US"/>
+          </a:p>
+        </p:txBody>
+      </p:sp>
+      <p:sp>
+        <p:nvSpPr>
+          <p:cNvPr id="5" name="TextBox 4">
+            <a:extLst>
+              <a:ext uri="{FF2B5EF4-FFF2-40B4-BE49-F238E27FC236}">
+                <a16:creationId xmlns:a16="http://schemas.microsoft.com/office/drawing/2014/main" id="{C155A8FD-87CB-82AB-4492-6DA23A48CB78}"/>
+              </a:ext>
+            </a:extLst>
+          </p:cNvPr>
+          <p:cNvSpPr txBox="1"/>
+          <p:nvPr/>
+        </p:nvSpPr>
+        <p:spPr>
+          <a:xfrm>
+            <a:off x="5322094" y="2230823"/>
+            <a:ext cx="1547812" cy="461665"/>
+          </a:xfrm>
+          <a:prstGeom prst="rect">
+            <a:avLst/>
+          </a:prstGeom>
+          <a:noFill/>
+        </p:spPr>
+        <p:txBody>
+          <a:bodyPr wrap="square">
+            <a:spAutoFit/>
+          </a:bodyPr>
+          <a:lstStyle/>
+          <a:p>
+            <a:pPr algn="ctr"/>
+            <a:r>
+              <a:rPr lang="en-US" sz="2400" dirty="0"/>
+              <a:t>REIT4841</a:t>
+            </a:r>
+            <a:endParaRPr lang="en-US" dirty="0"/>
+          </a:p>
+        </p:txBody>
+      </p:sp>
     </p:spTree>
     <p:extLst>
       <p:ext uri="{BB962C8B-B14F-4D97-AF65-F5344CB8AC3E}">
         <p14:creationId xmlns:p14="http://schemas.microsoft.com/office/powerpoint/2010/main" val="751801210"/>
+      </p:ext>
+    </p:extLst>
+  </p:cSld>
+  <p:clrMapOvr>
+    <a:masterClrMapping/>
+  </p:clrMapOvr>
+</p:sld>
+</file>
+
+<file path=ppt/slides/slide10.xml><?xml version="1.0" encoding="utf-8"?>
+<p:sld xmlns:a="http://schemas.openxmlformats.org/drawingml/2006/main" xmlns:r="http://schemas.openxmlformats.org/officeDocument/2006/relationships" xmlns:p="http://schemas.openxmlformats.org/presentationml/2006/main">
+  <p:cSld>
+    <p:spTree>
+      <p:nvGrpSpPr>
+        <p:cNvPr id="1" name=""/>
+        <p:cNvGrpSpPr/>
+        <p:nvPr/>
+      </p:nvGrpSpPr>
+      <p:grpSpPr>
+        <a:xfrm>
+          <a:off x="0" y="0"/>
+          <a:ext cx="0" cy="0"/>
+          <a:chOff x="0" y="0"/>
+          <a:chExt cx="0" cy="0"/>
+        </a:xfrm>
+      </p:grpSpPr>
+      <p:sp>
+        <p:nvSpPr>
+          <p:cNvPr id="2" name="Title 1">
+            <a:extLst>
+              <a:ext uri="{FF2B5EF4-FFF2-40B4-BE49-F238E27FC236}">
+                <a16:creationId xmlns:a16="http://schemas.microsoft.com/office/drawing/2014/main" id="{DD08128E-5D69-A75D-7FC0-9DE8F8800230}"/>
+              </a:ext>
+            </a:extLst>
+          </p:cNvPr>
+          <p:cNvSpPr>
+            <a:spLocks noGrp="1"/>
+          </p:cNvSpPr>
+          <p:nvPr>
+            <p:ph type="title"/>
+          </p:nvPr>
+        </p:nvSpPr>
+        <p:spPr/>
+        <p:txBody>
+          <a:bodyPr/>
+          <a:lstStyle/>
+          <a:p>
+            <a:r>
+              <a:rPr lang="en-US" dirty="0"/>
+              <a:t>Cluster Network</a:t>
+            </a:r>
+          </a:p>
+        </p:txBody>
+      </p:sp>
+      <p:sp>
+        <p:nvSpPr>
+          <p:cNvPr id="4" name="Slide Number Placeholder 3">
+            <a:extLst>
+              <a:ext uri="{FF2B5EF4-FFF2-40B4-BE49-F238E27FC236}">
+                <a16:creationId xmlns:a16="http://schemas.microsoft.com/office/drawing/2014/main" id="{8FC32546-56E3-843A-1228-E2712B71BAB6}"/>
+              </a:ext>
+            </a:extLst>
+          </p:cNvPr>
+          <p:cNvSpPr>
+            <a:spLocks noGrp="1"/>
+          </p:cNvSpPr>
+          <p:nvPr>
+            <p:ph type="sldNum" sz="quarter" idx="12"/>
+          </p:nvPr>
+        </p:nvSpPr>
+        <p:spPr/>
+        <p:txBody>
+          <a:bodyPr/>
+          <a:lstStyle/>
+          <a:p>
+            <a:fld id="{029AB40E-1F3D-A54A-8158-3F2FE1271995}" type="slidenum">
+              <a:rPr lang="en-US" smtClean="0"/>
+              <a:t>10</a:t>
+            </a:fld>
+            <a:endParaRPr lang="en-US"/>
+          </a:p>
+        </p:txBody>
+      </p:sp>
+      <p:sp>
+        <p:nvSpPr>
+          <p:cNvPr id="7" name="TextBox 6">
+            <a:extLst>
+              <a:ext uri="{FF2B5EF4-FFF2-40B4-BE49-F238E27FC236}">
+                <a16:creationId xmlns:a16="http://schemas.microsoft.com/office/drawing/2014/main" id="{76FEC4A6-DBA6-3C47-B86B-EFB853E5E422}"/>
+              </a:ext>
+            </a:extLst>
+          </p:cNvPr>
+          <p:cNvSpPr txBox="1"/>
+          <p:nvPr/>
+        </p:nvSpPr>
+        <p:spPr>
+          <a:xfrm>
+            <a:off x="8440661" y="2403127"/>
+            <a:ext cx="3581400" cy="2677656"/>
+          </a:xfrm>
+          <a:prstGeom prst="rect">
+            <a:avLst/>
+          </a:prstGeom>
+          <a:noFill/>
+        </p:spPr>
+        <p:txBody>
+          <a:bodyPr wrap="square" rtlCol="0">
+            <a:spAutoFit/>
+          </a:bodyPr>
+          <a:lstStyle/>
+          <a:p>
+            <a:r>
+              <a:rPr lang="en-US" sz="2400" dirty="0"/>
+              <a:t>Server-side:</a:t>
+            </a:r>
+          </a:p>
+          <a:p>
+            <a:pPr marL="285750" indent="-285750">
+              <a:buFont typeface="Arial" panose="020B0604020202020204" pitchFamily="34" charset="0"/>
+              <a:buChar char="•"/>
+            </a:pPr>
+            <a:r>
+              <a:rPr lang="en-US" sz="2400" dirty="0"/>
+              <a:t>SCPNS</a:t>
+            </a:r>
+          </a:p>
+          <a:p>
+            <a:endParaRPr lang="en-US" sz="2400" dirty="0"/>
+          </a:p>
+          <a:p>
+            <a:r>
+              <a:rPr lang="en-US" sz="2400" dirty="0"/>
+              <a:t>Client-side:</a:t>
+            </a:r>
+          </a:p>
+          <a:p>
+            <a:pPr marL="342900" indent="-342900">
+              <a:buFont typeface="Arial" panose="020B0604020202020204" pitchFamily="34" charset="0"/>
+              <a:buChar char="•"/>
+            </a:pPr>
+            <a:r>
+              <a:rPr lang="en-US" sz="2400" dirty="0"/>
+              <a:t>Containers ”spamming” messages</a:t>
+            </a:r>
+          </a:p>
+          <a:p>
+            <a:pPr marL="342900" indent="-342900">
+              <a:buFont typeface="Arial" panose="020B0604020202020204" pitchFamily="34" charset="0"/>
+              <a:buChar char="•"/>
+            </a:pPr>
+            <a:r>
+              <a:rPr lang="en-US" sz="2400" dirty="0"/>
+              <a:t>Scalable</a:t>
+            </a:r>
+          </a:p>
+        </p:txBody>
+      </p:sp>
+      <p:sp>
+        <p:nvSpPr>
+          <p:cNvPr id="17" name="TextBox 16">
+            <a:extLst>
+              <a:ext uri="{FF2B5EF4-FFF2-40B4-BE49-F238E27FC236}">
+                <a16:creationId xmlns:a16="http://schemas.microsoft.com/office/drawing/2014/main" id="{1CD439B0-3CB3-80AE-1B5E-F63FE5C69E1D}"/>
+              </a:ext>
+            </a:extLst>
+          </p:cNvPr>
+          <p:cNvSpPr txBox="1"/>
+          <p:nvPr/>
+        </p:nvSpPr>
+        <p:spPr>
+          <a:xfrm>
+            <a:off x="5561765" y="4976097"/>
+            <a:ext cx="381836" cy="369332"/>
+          </a:xfrm>
+          <a:prstGeom prst="rect">
+            <a:avLst/>
+          </a:prstGeom>
+          <a:noFill/>
+        </p:spPr>
+        <p:txBody>
+          <a:bodyPr wrap="square" rtlCol="0">
+            <a:spAutoFit/>
+          </a:bodyPr>
+          <a:lstStyle/>
+          <a:p>
+            <a:r>
+              <a:rPr lang="en-US" dirty="0"/>
+              <a:t>…</a:t>
+            </a:r>
+          </a:p>
+        </p:txBody>
+      </p:sp>
+      <p:pic>
+        <p:nvPicPr>
+          <p:cNvPr id="19" name="Picture 18" descr="A black background with a black square&#10;&#10;Description automatically generated with medium confidence">
+            <a:extLst>
+              <a:ext uri="{FF2B5EF4-FFF2-40B4-BE49-F238E27FC236}">
+                <a16:creationId xmlns:a16="http://schemas.microsoft.com/office/drawing/2014/main" id="{7EB21585-B989-5FF4-200A-3CFDB05A85AD}"/>
+              </a:ext>
+            </a:extLst>
+          </p:cNvPr>
+          <p:cNvPicPr>
+            <a:picLocks noChangeAspect="1"/>
+          </p:cNvPicPr>
+          <p:nvPr/>
+        </p:nvPicPr>
+        <p:blipFill>
+          <a:blip r:embed="rId2"/>
+          <a:stretch>
+            <a:fillRect/>
+          </a:stretch>
+        </p:blipFill>
+        <p:spPr>
+          <a:xfrm>
+            <a:off x="443070" y="2183076"/>
+            <a:ext cx="7794395" cy="3117758"/>
+          </a:xfrm>
+          <a:prstGeom prst="rect">
+            <a:avLst/>
+          </a:prstGeom>
+        </p:spPr>
+      </p:pic>
+      <p:sp>
+        <p:nvSpPr>
+          <p:cNvPr id="20" name="TextBox 19">
+            <a:extLst>
+              <a:ext uri="{FF2B5EF4-FFF2-40B4-BE49-F238E27FC236}">
+                <a16:creationId xmlns:a16="http://schemas.microsoft.com/office/drawing/2014/main" id="{67223173-6E06-96A2-5082-C847E79CB325}"/>
+              </a:ext>
+            </a:extLst>
+          </p:cNvPr>
+          <p:cNvSpPr txBox="1"/>
+          <p:nvPr/>
+        </p:nvSpPr>
+        <p:spPr>
+          <a:xfrm>
+            <a:off x="443070" y="5793222"/>
+            <a:ext cx="7476067" cy="523220"/>
+          </a:xfrm>
+          <a:prstGeom prst="rect">
+            <a:avLst/>
+          </a:prstGeom>
+          <a:noFill/>
+        </p:spPr>
+        <p:txBody>
+          <a:bodyPr wrap="square" rtlCol="0">
+            <a:spAutoFit/>
+          </a:bodyPr>
+          <a:lstStyle/>
+          <a:p>
+            <a:r>
+              <a:rPr lang="en-US" sz="2800" dirty="0"/>
+              <a:t>And the RPI3 should be able to run many clients</a:t>
+            </a:r>
+          </a:p>
+        </p:txBody>
+      </p:sp>
+    </p:spTree>
+    <p:extLst>
+      <p:ext uri="{BB962C8B-B14F-4D97-AF65-F5344CB8AC3E}">
+        <p14:creationId xmlns:p14="http://schemas.microsoft.com/office/powerpoint/2010/main" val="4186471742"/>
+      </p:ext>
+    </p:extLst>
+  </p:cSld>
+  <p:clrMapOvr>
+    <a:masterClrMapping/>
+  </p:clrMapOvr>
+</p:sld>
+</file>
+
+<file path=ppt/slides/slide11.xml><?xml version="1.0" encoding="utf-8"?>
+<p:sld xmlns:a="http://schemas.openxmlformats.org/drawingml/2006/main" xmlns:r="http://schemas.openxmlformats.org/officeDocument/2006/relationships" xmlns:p="http://schemas.openxmlformats.org/presentationml/2006/main">
+  <p:cSld>
+    <p:spTree>
+      <p:nvGrpSpPr>
+        <p:cNvPr id="1" name=""/>
+        <p:cNvGrpSpPr/>
+        <p:nvPr/>
+      </p:nvGrpSpPr>
+      <p:grpSpPr>
+        <a:xfrm>
+          <a:off x="0" y="0"/>
+          <a:ext cx="0" cy="0"/>
+          <a:chOff x="0" y="0"/>
+          <a:chExt cx="0" cy="0"/>
+        </a:xfrm>
+      </p:grpSpPr>
+      <p:sp>
+        <p:nvSpPr>
+          <p:cNvPr id="2" name="Title 1">
+            <a:extLst>
+              <a:ext uri="{FF2B5EF4-FFF2-40B4-BE49-F238E27FC236}">
+                <a16:creationId xmlns:a16="http://schemas.microsoft.com/office/drawing/2014/main" id="{1B7A2D0F-EF55-D631-E448-7C5847EB69E5}"/>
+              </a:ext>
+            </a:extLst>
+          </p:cNvPr>
+          <p:cNvSpPr>
+            <a:spLocks noGrp="1"/>
+          </p:cNvSpPr>
+          <p:nvPr>
+            <p:ph type="title"/>
+          </p:nvPr>
+        </p:nvSpPr>
+        <p:spPr/>
+        <p:txBody>
+          <a:bodyPr/>
+          <a:lstStyle/>
+          <a:p>
+            <a:r>
+              <a:rPr lang="en-US" dirty="0"/>
+              <a:t>Project Plan – Semester 1</a:t>
+            </a:r>
+          </a:p>
+        </p:txBody>
+      </p:sp>
+      <p:graphicFrame>
+        <p:nvGraphicFramePr>
+          <p:cNvPr id="5" name="Content Placeholder 4">
+            <a:extLst>
+              <a:ext uri="{FF2B5EF4-FFF2-40B4-BE49-F238E27FC236}">
+                <a16:creationId xmlns:a16="http://schemas.microsoft.com/office/drawing/2014/main" id="{22152FF1-FD21-D032-24E1-D32A441FF39E}"/>
+              </a:ext>
+            </a:extLst>
+          </p:cNvPr>
+          <p:cNvGraphicFramePr>
+            <a:graphicFrameLocks noGrp="1"/>
+          </p:cNvGraphicFramePr>
+          <p:nvPr>
+            <p:ph idx="1"/>
+            <p:extLst>
+              <p:ext uri="{D42A27DB-BD31-4B8C-83A1-F6EECF244321}">
+                <p14:modId xmlns:p14="http://schemas.microsoft.com/office/powerpoint/2010/main" val="158348525"/>
+              </p:ext>
+            </p:extLst>
+          </p:nvPr>
+        </p:nvGraphicFramePr>
+        <p:xfrm>
+          <a:off x="2541240" y="2133600"/>
+          <a:ext cx="7109519" cy="2590800"/>
+        </p:xfrm>
+        <a:graphic>
+          <a:graphicData uri="http://schemas.openxmlformats.org/drawingml/2006/table">
+            <a:tbl>
+              <a:tblPr firstRow="1" bandRow="1">
+                <a:tableStyleId>{9D7B26C5-4107-4FEC-AEDC-1716B250A1EF}</a:tableStyleId>
+              </a:tblPr>
+              <a:tblGrid>
+                <a:gridCol w="3962972">
+                  <a:extLst>
+                    <a:ext uri="{9D8B030D-6E8A-4147-A177-3AD203B41FA5}">
+                      <a16:colId xmlns:a16="http://schemas.microsoft.com/office/drawing/2014/main" val="800522558"/>
+                    </a:ext>
+                  </a:extLst>
+                </a:gridCol>
+                <a:gridCol w="3146547">
+                  <a:extLst>
+                    <a:ext uri="{9D8B030D-6E8A-4147-A177-3AD203B41FA5}">
+                      <a16:colId xmlns:a16="http://schemas.microsoft.com/office/drawing/2014/main" val="2844171473"/>
+                    </a:ext>
+                  </a:extLst>
+                </a:gridCol>
+              </a:tblGrid>
+              <a:tr h="370840">
+                <a:tc>
+                  <a:txBody>
+                    <a:bodyPr/>
+                    <a:lstStyle/>
+                    <a:p>
+                      <a:pPr algn="l"/>
+                      <a:r>
+                        <a:rPr lang="en-US" sz="2800" dirty="0"/>
+                        <a:t>Task</a:t>
+                      </a:r>
+                    </a:p>
+                  </a:txBody>
+                  <a:tcPr/>
+                </a:tc>
+                <a:tc>
+                  <a:txBody>
+                    <a:bodyPr/>
+                    <a:lstStyle/>
+                    <a:p>
+                      <a:pPr algn="l"/>
+                      <a:r>
+                        <a:rPr lang="en-US" sz="2800" dirty="0"/>
+                        <a:t>Due</a:t>
+                      </a:r>
+                    </a:p>
+                  </a:txBody>
+                  <a:tcPr/>
+                </a:tc>
+                <a:extLst>
+                  <a:ext uri="{0D108BD9-81ED-4DB2-BD59-A6C34878D82A}">
+                    <a16:rowId xmlns:a16="http://schemas.microsoft.com/office/drawing/2014/main" val="335507864"/>
+                  </a:ext>
+                </a:extLst>
+              </a:tr>
+              <a:tr h="370840">
+                <a:tc>
+                  <a:txBody>
+                    <a:bodyPr/>
+                    <a:lstStyle/>
+                    <a:p>
+                      <a:pPr algn="l"/>
+                      <a:r>
+                        <a:rPr lang="en-US" sz="2800" b="1" dirty="0"/>
+                        <a:t>Proposal</a:t>
+                      </a:r>
+                    </a:p>
+                  </a:txBody>
+                  <a:tcPr/>
+                </a:tc>
+                <a:tc>
+                  <a:txBody>
+                    <a:bodyPr/>
+                    <a:lstStyle/>
+                    <a:p>
+                      <a:pPr algn="l"/>
+                      <a:r>
+                        <a:rPr lang="en-US" sz="2800" dirty="0"/>
+                        <a:t>Week 8</a:t>
+                      </a:r>
+                    </a:p>
+                  </a:txBody>
+                  <a:tcPr/>
+                </a:tc>
+                <a:extLst>
+                  <a:ext uri="{0D108BD9-81ED-4DB2-BD59-A6C34878D82A}">
+                    <a16:rowId xmlns:a16="http://schemas.microsoft.com/office/drawing/2014/main" val="2559517830"/>
+                  </a:ext>
+                </a:extLst>
+              </a:tr>
+              <a:tr h="370840">
+                <a:tc>
+                  <a:txBody>
+                    <a:bodyPr/>
+                    <a:lstStyle/>
+                    <a:p>
+                      <a:pPr algn="l"/>
+                      <a:r>
+                        <a:rPr lang="en-US" sz="2800" dirty="0"/>
+                        <a:t>Interface </a:t>
+                      </a:r>
+                      <a:r>
+                        <a:rPr lang="en-US" sz="2800" dirty="0" err="1"/>
+                        <a:t>Rpi</a:t>
+                      </a:r>
+                      <a:r>
+                        <a:rPr lang="en-US" sz="2800" dirty="0"/>
+                        <a:t>/s to Router</a:t>
+                      </a:r>
+                    </a:p>
+                  </a:txBody>
+                  <a:tcPr/>
+                </a:tc>
+                <a:tc>
+                  <a:txBody>
+                    <a:bodyPr/>
+                    <a:lstStyle/>
+                    <a:p>
+                      <a:pPr algn="l"/>
+                      <a:r>
+                        <a:rPr lang="en-US" sz="2800" dirty="0"/>
+                        <a:t>Week 9</a:t>
+                      </a:r>
+                    </a:p>
+                  </a:txBody>
+                  <a:tcPr/>
+                </a:tc>
+                <a:extLst>
+                  <a:ext uri="{0D108BD9-81ED-4DB2-BD59-A6C34878D82A}">
+                    <a16:rowId xmlns:a16="http://schemas.microsoft.com/office/drawing/2014/main" val="2714553174"/>
+                  </a:ext>
+                </a:extLst>
+              </a:tr>
+              <a:tr h="370840">
+                <a:tc>
+                  <a:txBody>
+                    <a:bodyPr/>
+                    <a:lstStyle/>
+                    <a:p>
+                      <a:pPr algn="l"/>
+                      <a:r>
+                        <a:rPr lang="en-US" sz="2800" dirty="0"/>
+                        <a:t>Set up Cluster Network</a:t>
+                      </a:r>
+                    </a:p>
+                  </a:txBody>
+                  <a:tcPr/>
+                </a:tc>
+                <a:tc>
+                  <a:txBody>
+                    <a:bodyPr/>
+                    <a:lstStyle/>
+                    <a:p>
+                      <a:pPr algn="l"/>
+                      <a:r>
+                        <a:rPr lang="en-US" sz="2800" dirty="0"/>
+                        <a:t>Week 10</a:t>
+                      </a:r>
+                    </a:p>
+                  </a:txBody>
+                  <a:tcPr/>
+                </a:tc>
+                <a:extLst>
+                  <a:ext uri="{0D108BD9-81ED-4DB2-BD59-A6C34878D82A}">
+                    <a16:rowId xmlns:a16="http://schemas.microsoft.com/office/drawing/2014/main" val="2424102202"/>
+                  </a:ext>
+                </a:extLst>
+              </a:tr>
+              <a:tr h="370840">
+                <a:tc>
+                  <a:txBody>
+                    <a:bodyPr/>
+                    <a:lstStyle/>
+                    <a:p>
+                      <a:pPr algn="l"/>
+                      <a:r>
+                        <a:rPr lang="en-US" sz="2800" b="1" dirty="0"/>
+                        <a:t>Seminar</a:t>
+                      </a:r>
+                    </a:p>
+                  </a:txBody>
+                  <a:tcPr/>
+                </a:tc>
+                <a:tc>
+                  <a:txBody>
+                    <a:bodyPr/>
+                    <a:lstStyle/>
+                    <a:p>
+                      <a:pPr algn="l"/>
+                      <a:r>
+                        <a:rPr lang="en-US" sz="2800" dirty="0"/>
+                        <a:t>Week 11</a:t>
+                      </a:r>
+                    </a:p>
+                  </a:txBody>
+                  <a:tcPr/>
+                </a:tc>
+                <a:extLst>
+                  <a:ext uri="{0D108BD9-81ED-4DB2-BD59-A6C34878D82A}">
+                    <a16:rowId xmlns:a16="http://schemas.microsoft.com/office/drawing/2014/main" val="3255806005"/>
+                  </a:ext>
+                </a:extLst>
+              </a:tr>
+            </a:tbl>
+          </a:graphicData>
+        </a:graphic>
+      </p:graphicFrame>
+      <p:sp>
+        <p:nvSpPr>
+          <p:cNvPr id="3" name="Slide Number Placeholder 2">
+            <a:extLst>
+              <a:ext uri="{FF2B5EF4-FFF2-40B4-BE49-F238E27FC236}">
+                <a16:creationId xmlns:a16="http://schemas.microsoft.com/office/drawing/2014/main" id="{800B902C-8871-0594-4212-0921D0DF6432}"/>
+              </a:ext>
+            </a:extLst>
+          </p:cNvPr>
+          <p:cNvSpPr>
+            <a:spLocks noGrp="1"/>
+          </p:cNvSpPr>
+          <p:nvPr>
+            <p:ph type="sldNum" sz="quarter" idx="12"/>
+          </p:nvPr>
+        </p:nvSpPr>
+        <p:spPr/>
+        <p:txBody>
+          <a:bodyPr/>
+          <a:lstStyle/>
+          <a:p>
+            <a:fld id="{029AB40E-1F3D-A54A-8158-3F2FE1271995}" type="slidenum">
+              <a:rPr lang="en-US" smtClean="0"/>
+              <a:t>11</a:t>
+            </a:fld>
+            <a:endParaRPr lang="en-US"/>
+          </a:p>
+        </p:txBody>
+      </p:sp>
+    </p:spTree>
+    <p:extLst>
+      <p:ext uri="{BB962C8B-B14F-4D97-AF65-F5344CB8AC3E}">
+        <p14:creationId xmlns:p14="http://schemas.microsoft.com/office/powerpoint/2010/main" val="3026550673"/>
+      </p:ext>
+    </p:extLst>
+  </p:cSld>
+  <p:clrMapOvr>
+    <a:masterClrMapping/>
+  </p:clrMapOvr>
+</p:sld>
+</file>
+
+<file path=ppt/slides/slide12.xml><?xml version="1.0" encoding="utf-8"?>
+<p:sld xmlns:a="http://schemas.openxmlformats.org/drawingml/2006/main" xmlns:r="http://schemas.openxmlformats.org/officeDocument/2006/relationships" xmlns:p="http://schemas.openxmlformats.org/presentationml/2006/main">
+  <p:cSld>
+    <p:spTree>
+      <p:nvGrpSpPr>
+        <p:cNvPr id="1" name=""/>
+        <p:cNvGrpSpPr/>
+        <p:nvPr/>
+      </p:nvGrpSpPr>
+      <p:grpSpPr>
+        <a:xfrm>
+          <a:off x="0" y="0"/>
+          <a:ext cx="0" cy="0"/>
+          <a:chOff x="0" y="0"/>
+          <a:chExt cx="0" cy="0"/>
+        </a:xfrm>
+      </p:grpSpPr>
+      <p:sp>
+        <p:nvSpPr>
+          <p:cNvPr id="2" name="Title 1">
+            <a:extLst>
+              <a:ext uri="{FF2B5EF4-FFF2-40B4-BE49-F238E27FC236}">
+                <a16:creationId xmlns:a16="http://schemas.microsoft.com/office/drawing/2014/main" id="{405BEDE3-0BC1-3B6B-4D19-037709E3DB83}"/>
+              </a:ext>
+            </a:extLst>
+          </p:cNvPr>
+          <p:cNvSpPr>
+            <a:spLocks noGrp="1"/>
+          </p:cNvSpPr>
+          <p:nvPr>
+            <p:ph type="title"/>
+          </p:nvPr>
+        </p:nvSpPr>
+        <p:spPr/>
+        <p:txBody>
+          <a:bodyPr/>
+          <a:lstStyle/>
+          <a:p>
+            <a:r>
+              <a:rPr lang="en-US" dirty="0"/>
+              <a:t>Break</a:t>
+            </a:r>
+          </a:p>
+        </p:txBody>
+      </p:sp>
+      <p:graphicFrame>
+        <p:nvGraphicFramePr>
+          <p:cNvPr id="4" name="Content Placeholder 3">
+            <a:extLst>
+              <a:ext uri="{FF2B5EF4-FFF2-40B4-BE49-F238E27FC236}">
+                <a16:creationId xmlns:a16="http://schemas.microsoft.com/office/drawing/2014/main" id="{EC90758D-D337-5DA5-32DB-74BE8F3D59D0}"/>
+              </a:ext>
+            </a:extLst>
+          </p:cNvPr>
+          <p:cNvGraphicFramePr>
+            <a:graphicFrameLocks noGrp="1"/>
+          </p:cNvGraphicFramePr>
+          <p:nvPr>
+            <p:ph idx="1"/>
+            <p:extLst>
+              <p:ext uri="{D42A27DB-BD31-4B8C-83A1-F6EECF244321}">
+                <p14:modId xmlns:p14="http://schemas.microsoft.com/office/powerpoint/2010/main" val="3359178850"/>
+              </p:ext>
+            </p:extLst>
+          </p:nvPr>
+        </p:nvGraphicFramePr>
+        <p:xfrm>
+          <a:off x="2082800" y="2133600"/>
+          <a:ext cx="8348134" cy="2590800"/>
+        </p:xfrm>
+        <a:graphic>
+          <a:graphicData uri="http://schemas.openxmlformats.org/drawingml/2006/table">
+            <a:tbl>
+              <a:tblPr firstRow="1" bandRow="1">
+                <a:tableStyleId>{9D7B26C5-4107-4FEC-AEDC-1716B250A1EF}</a:tableStyleId>
+              </a:tblPr>
+              <a:tblGrid>
+                <a:gridCol w="3834855">
+                  <a:extLst>
+                    <a:ext uri="{9D8B030D-6E8A-4147-A177-3AD203B41FA5}">
+                      <a16:colId xmlns:a16="http://schemas.microsoft.com/office/drawing/2014/main" val="1783344618"/>
+                    </a:ext>
+                  </a:extLst>
+                </a:gridCol>
+                <a:gridCol w="4513279">
+                  <a:extLst>
+                    <a:ext uri="{9D8B030D-6E8A-4147-A177-3AD203B41FA5}">
+                      <a16:colId xmlns:a16="http://schemas.microsoft.com/office/drawing/2014/main" val="2873088731"/>
+                    </a:ext>
+                  </a:extLst>
+                </a:gridCol>
+              </a:tblGrid>
+              <a:tr h="367665">
+                <a:tc>
+                  <a:txBody>
+                    <a:bodyPr/>
+                    <a:lstStyle/>
+                    <a:p>
+                      <a:r>
+                        <a:rPr lang="en-US" sz="2800" dirty="0"/>
+                        <a:t>Task</a:t>
+                      </a:r>
+                    </a:p>
+                  </a:txBody>
+                  <a:tcPr/>
+                </a:tc>
+                <a:tc>
+                  <a:txBody>
+                    <a:bodyPr/>
+                    <a:lstStyle/>
+                    <a:p>
+                      <a:r>
+                        <a:rPr lang="en-US" sz="2800" dirty="0"/>
+                        <a:t>Due</a:t>
+                      </a:r>
+                    </a:p>
+                  </a:txBody>
+                  <a:tcPr/>
+                </a:tc>
+                <a:extLst>
+                  <a:ext uri="{0D108BD9-81ED-4DB2-BD59-A6C34878D82A}">
+                    <a16:rowId xmlns:a16="http://schemas.microsoft.com/office/drawing/2014/main" val="2186732107"/>
+                  </a:ext>
+                </a:extLst>
+              </a:tr>
+              <a:tr h="370840">
+                <a:tc>
+                  <a:txBody>
+                    <a:bodyPr/>
+                    <a:lstStyle/>
+                    <a:p>
+                      <a:r>
+                        <a:rPr lang="en-US" sz="2800" dirty="0"/>
+                        <a:t>Create the SCPNS</a:t>
+                      </a:r>
+                    </a:p>
+                  </a:txBody>
+                  <a:tcPr/>
+                </a:tc>
+                <a:tc>
+                  <a:txBody>
+                    <a:bodyPr/>
+                    <a:lstStyle/>
+                    <a:p>
+                      <a:r>
+                        <a:rPr lang="en-US" sz="2800" dirty="0"/>
+                        <a:t>Week 1</a:t>
+                      </a:r>
+                    </a:p>
+                  </a:txBody>
+                  <a:tcPr/>
+                </a:tc>
+                <a:extLst>
+                  <a:ext uri="{0D108BD9-81ED-4DB2-BD59-A6C34878D82A}">
+                    <a16:rowId xmlns:a16="http://schemas.microsoft.com/office/drawing/2014/main" val="1578452835"/>
+                  </a:ext>
+                </a:extLst>
+              </a:tr>
+              <a:tr h="370840">
+                <a:tc>
+                  <a:txBody>
+                    <a:bodyPr/>
+                    <a:lstStyle/>
+                    <a:p>
+                      <a:r>
+                        <a:rPr lang="en-US" sz="2800" dirty="0"/>
+                        <a:t>Run Zephyr</a:t>
+                      </a:r>
+                    </a:p>
+                  </a:txBody>
+                  <a:tcPr/>
+                </a:tc>
+                <a:tc>
+                  <a:txBody>
+                    <a:bodyPr/>
+                    <a:lstStyle/>
+                    <a:p>
+                      <a:r>
+                        <a:rPr lang="en-US" sz="2800" dirty="0"/>
+                        <a:t>Week 2</a:t>
+                      </a:r>
+                    </a:p>
+                  </a:txBody>
+                  <a:tcPr/>
+                </a:tc>
+                <a:extLst>
+                  <a:ext uri="{0D108BD9-81ED-4DB2-BD59-A6C34878D82A}">
+                    <a16:rowId xmlns:a16="http://schemas.microsoft.com/office/drawing/2014/main" val="3118966515"/>
+                  </a:ext>
+                </a:extLst>
+              </a:tr>
+              <a:tr h="370840">
+                <a:tc>
+                  <a:txBody>
+                    <a:bodyPr/>
+                    <a:lstStyle/>
+                    <a:p>
+                      <a:r>
+                        <a:rPr lang="en-US" sz="2800" dirty="0"/>
+                        <a:t>Interface Network Core</a:t>
+                      </a:r>
+                    </a:p>
+                  </a:txBody>
+                  <a:tcPr/>
+                </a:tc>
+                <a:tc>
+                  <a:txBody>
+                    <a:bodyPr/>
+                    <a:lstStyle/>
+                    <a:p>
+                      <a:r>
+                        <a:rPr lang="en-US" sz="2800" dirty="0"/>
+                        <a:t>Week 3</a:t>
+                      </a:r>
+                    </a:p>
+                  </a:txBody>
+                  <a:tcPr/>
+                </a:tc>
+                <a:extLst>
+                  <a:ext uri="{0D108BD9-81ED-4DB2-BD59-A6C34878D82A}">
+                    <a16:rowId xmlns:a16="http://schemas.microsoft.com/office/drawing/2014/main" val="890377774"/>
+                  </a:ext>
+                </a:extLst>
+              </a:tr>
+              <a:tr h="370840">
+                <a:tc>
+                  <a:txBody>
+                    <a:bodyPr/>
+                    <a:lstStyle/>
+                    <a:p>
+                      <a:r>
+                        <a:rPr lang="en-US" sz="2800" dirty="0"/>
+                        <a:t>AES Encryption Engine</a:t>
+                      </a:r>
+                    </a:p>
+                  </a:txBody>
+                  <a:tcPr/>
+                </a:tc>
+                <a:tc>
+                  <a:txBody>
+                    <a:bodyPr/>
+                    <a:lstStyle/>
+                    <a:p>
+                      <a:r>
+                        <a:rPr lang="en-US" sz="2800" dirty="0"/>
+                        <a:t>Week 3-4</a:t>
+                      </a:r>
+                    </a:p>
+                  </a:txBody>
+                  <a:tcPr/>
+                </a:tc>
+                <a:extLst>
+                  <a:ext uri="{0D108BD9-81ED-4DB2-BD59-A6C34878D82A}">
+                    <a16:rowId xmlns:a16="http://schemas.microsoft.com/office/drawing/2014/main" val="2430726016"/>
+                  </a:ext>
+                </a:extLst>
+              </a:tr>
+            </a:tbl>
+          </a:graphicData>
+        </a:graphic>
+      </p:graphicFrame>
+      <p:sp>
+        <p:nvSpPr>
+          <p:cNvPr id="3" name="Slide Number Placeholder 2">
+            <a:extLst>
+              <a:ext uri="{FF2B5EF4-FFF2-40B4-BE49-F238E27FC236}">
+                <a16:creationId xmlns:a16="http://schemas.microsoft.com/office/drawing/2014/main" id="{38B05F6D-F8B3-0020-40F0-A32F990860C5}"/>
+              </a:ext>
+            </a:extLst>
+          </p:cNvPr>
+          <p:cNvSpPr>
+            <a:spLocks noGrp="1"/>
+          </p:cNvSpPr>
+          <p:nvPr>
+            <p:ph type="sldNum" sz="quarter" idx="12"/>
+          </p:nvPr>
+        </p:nvSpPr>
+        <p:spPr/>
+        <p:txBody>
+          <a:bodyPr/>
+          <a:lstStyle/>
+          <a:p>
+            <a:fld id="{029AB40E-1F3D-A54A-8158-3F2FE1271995}" type="slidenum">
+              <a:rPr lang="en-US" smtClean="0"/>
+              <a:t>12</a:t>
+            </a:fld>
+            <a:endParaRPr lang="en-US"/>
+          </a:p>
+        </p:txBody>
+      </p:sp>
+    </p:spTree>
+    <p:extLst>
+      <p:ext uri="{BB962C8B-B14F-4D97-AF65-F5344CB8AC3E}">
+        <p14:creationId xmlns:p14="http://schemas.microsoft.com/office/powerpoint/2010/main" val="2206045743"/>
+      </p:ext>
+    </p:extLst>
+  </p:cSld>
+  <p:clrMapOvr>
+    <a:masterClrMapping/>
+  </p:clrMapOvr>
+</p:sld>
+</file>
+
+<file path=ppt/slides/slide13.xml><?xml version="1.0" encoding="utf-8"?>
+<p:sld xmlns:a="http://schemas.openxmlformats.org/drawingml/2006/main" xmlns:r="http://schemas.openxmlformats.org/officeDocument/2006/relationships" xmlns:p="http://schemas.openxmlformats.org/presentationml/2006/main">
+  <p:cSld>
+    <p:spTree>
+      <p:nvGrpSpPr>
+        <p:cNvPr id="1" name=""/>
+        <p:cNvGrpSpPr/>
+        <p:nvPr/>
+      </p:nvGrpSpPr>
+      <p:grpSpPr>
+        <a:xfrm>
+          <a:off x="0" y="0"/>
+          <a:ext cx="0" cy="0"/>
+          <a:chOff x="0" y="0"/>
+          <a:chExt cx="0" cy="0"/>
+        </a:xfrm>
+      </p:grpSpPr>
+      <p:sp>
+        <p:nvSpPr>
+          <p:cNvPr id="2" name="Title 1">
+            <a:extLst>
+              <a:ext uri="{FF2B5EF4-FFF2-40B4-BE49-F238E27FC236}">
+                <a16:creationId xmlns:a16="http://schemas.microsoft.com/office/drawing/2014/main" id="{4C272918-F3CB-5CF1-A3A5-F017968715C3}"/>
+              </a:ext>
+            </a:extLst>
+          </p:cNvPr>
+          <p:cNvSpPr>
+            <a:spLocks noGrp="1"/>
+          </p:cNvSpPr>
+          <p:nvPr>
+            <p:ph type="title"/>
+          </p:nvPr>
+        </p:nvSpPr>
+        <p:spPr/>
+        <p:txBody>
+          <a:bodyPr/>
+          <a:lstStyle/>
+          <a:p>
+            <a:r>
+              <a:rPr lang="en-US" dirty="0"/>
+              <a:t>Semester 2</a:t>
+            </a:r>
+          </a:p>
+        </p:txBody>
+      </p:sp>
+      <p:graphicFrame>
+        <p:nvGraphicFramePr>
+          <p:cNvPr id="4" name="Content Placeholder 3">
+            <a:extLst>
+              <a:ext uri="{FF2B5EF4-FFF2-40B4-BE49-F238E27FC236}">
+                <a16:creationId xmlns:a16="http://schemas.microsoft.com/office/drawing/2014/main" id="{8C4A1ABE-8F33-F3EA-A73F-4959C72C28A5}"/>
+              </a:ext>
+            </a:extLst>
+          </p:cNvPr>
+          <p:cNvGraphicFramePr>
+            <a:graphicFrameLocks noGrp="1"/>
+          </p:cNvGraphicFramePr>
+          <p:nvPr>
+            <p:ph idx="1"/>
+            <p:extLst>
+              <p:ext uri="{D42A27DB-BD31-4B8C-83A1-F6EECF244321}">
+                <p14:modId xmlns:p14="http://schemas.microsoft.com/office/powerpoint/2010/main" val="671155591"/>
+              </p:ext>
+            </p:extLst>
+          </p:nvPr>
+        </p:nvGraphicFramePr>
+        <p:xfrm>
+          <a:off x="1998133" y="2133600"/>
+          <a:ext cx="8195734" cy="2590800"/>
+        </p:xfrm>
+        <a:graphic>
+          <a:graphicData uri="http://schemas.openxmlformats.org/drawingml/2006/table">
+            <a:tbl>
+              <a:tblPr firstRow="1" bandRow="1">
+                <a:tableStyleId>{9D7B26C5-4107-4FEC-AEDC-1716B250A1EF}</a:tableStyleId>
+              </a:tblPr>
+              <a:tblGrid>
+                <a:gridCol w="4097867">
+                  <a:extLst>
+                    <a:ext uri="{9D8B030D-6E8A-4147-A177-3AD203B41FA5}">
+                      <a16:colId xmlns:a16="http://schemas.microsoft.com/office/drawing/2014/main" val="752460074"/>
+                    </a:ext>
+                  </a:extLst>
+                </a:gridCol>
+                <a:gridCol w="4097867">
+                  <a:extLst>
+                    <a:ext uri="{9D8B030D-6E8A-4147-A177-3AD203B41FA5}">
+                      <a16:colId xmlns:a16="http://schemas.microsoft.com/office/drawing/2014/main" val="2507259920"/>
+                    </a:ext>
+                  </a:extLst>
+                </a:gridCol>
+              </a:tblGrid>
+              <a:tr h="370840">
+                <a:tc>
+                  <a:txBody>
+                    <a:bodyPr/>
+                    <a:lstStyle/>
+                    <a:p>
+                      <a:r>
+                        <a:rPr lang="en-US" sz="2800" dirty="0"/>
+                        <a:t>Task</a:t>
+                      </a:r>
+                    </a:p>
+                  </a:txBody>
+                  <a:tcPr/>
+                </a:tc>
+                <a:tc>
+                  <a:txBody>
+                    <a:bodyPr/>
+                    <a:lstStyle/>
+                    <a:p>
+                      <a:r>
+                        <a:rPr lang="en-US" sz="2800" dirty="0"/>
+                        <a:t>Due</a:t>
+                      </a:r>
+                    </a:p>
+                  </a:txBody>
+                  <a:tcPr/>
+                </a:tc>
+                <a:extLst>
+                  <a:ext uri="{0D108BD9-81ED-4DB2-BD59-A6C34878D82A}">
+                    <a16:rowId xmlns:a16="http://schemas.microsoft.com/office/drawing/2014/main" val="3311549226"/>
+                  </a:ext>
+                </a:extLst>
+              </a:tr>
+              <a:tr h="370840">
+                <a:tc>
+                  <a:txBody>
+                    <a:bodyPr/>
+                    <a:lstStyle/>
+                    <a:p>
+                      <a:r>
+                        <a:rPr lang="en-US" sz="2800" dirty="0"/>
+                        <a:t>Experimentation</a:t>
+                      </a:r>
+                    </a:p>
+                  </a:txBody>
+                  <a:tcPr/>
+                </a:tc>
+                <a:tc>
+                  <a:txBody>
+                    <a:bodyPr/>
+                    <a:lstStyle/>
+                    <a:p>
+                      <a:r>
+                        <a:rPr lang="en-US" sz="2800" dirty="0"/>
+                        <a:t>Week 1</a:t>
+                      </a:r>
+                    </a:p>
+                  </a:txBody>
+                  <a:tcPr/>
+                </a:tc>
+                <a:extLst>
+                  <a:ext uri="{0D108BD9-81ED-4DB2-BD59-A6C34878D82A}">
+                    <a16:rowId xmlns:a16="http://schemas.microsoft.com/office/drawing/2014/main" val="2037251175"/>
+                  </a:ext>
+                </a:extLst>
+              </a:tr>
+              <a:tr h="370840">
+                <a:tc>
+                  <a:txBody>
+                    <a:bodyPr/>
+                    <a:lstStyle/>
+                    <a:p>
+                      <a:r>
+                        <a:rPr lang="en-US" sz="2800" dirty="0"/>
+                        <a:t>Measure and Compare</a:t>
+                      </a:r>
+                    </a:p>
+                  </a:txBody>
+                  <a:tcPr/>
+                </a:tc>
+                <a:tc>
+                  <a:txBody>
+                    <a:bodyPr/>
+                    <a:lstStyle/>
+                    <a:p>
+                      <a:r>
+                        <a:rPr lang="en-US" sz="2800" dirty="0"/>
+                        <a:t>Week 2</a:t>
+                      </a:r>
+                    </a:p>
+                  </a:txBody>
+                  <a:tcPr/>
+                </a:tc>
+                <a:extLst>
+                  <a:ext uri="{0D108BD9-81ED-4DB2-BD59-A6C34878D82A}">
+                    <a16:rowId xmlns:a16="http://schemas.microsoft.com/office/drawing/2014/main" val="3363620341"/>
+                  </a:ext>
+                </a:extLst>
+              </a:tr>
+              <a:tr h="370840">
+                <a:tc>
+                  <a:txBody>
+                    <a:bodyPr/>
+                    <a:lstStyle/>
+                    <a:p>
+                      <a:r>
+                        <a:rPr lang="en-US" sz="2800" b="1" dirty="0"/>
+                        <a:t>Poster &amp; Demonstration</a:t>
+                      </a:r>
+                    </a:p>
+                  </a:txBody>
+                  <a:tcPr/>
+                </a:tc>
+                <a:tc>
+                  <a:txBody>
+                    <a:bodyPr/>
+                    <a:lstStyle/>
+                    <a:p>
+                      <a:r>
+                        <a:rPr lang="en-US" sz="2800" dirty="0"/>
+                        <a:t>Week 11</a:t>
+                      </a:r>
+                    </a:p>
+                  </a:txBody>
+                  <a:tcPr/>
+                </a:tc>
+                <a:extLst>
+                  <a:ext uri="{0D108BD9-81ED-4DB2-BD59-A6C34878D82A}">
+                    <a16:rowId xmlns:a16="http://schemas.microsoft.com/office/drawing/2014/main" val="2559891459"/>
+                  </a:ext>
+                </a:extLst>
+              </a:tr>
+              <a:tr h="370840">
+                <a:tc>
+                  <a:txBody>
+                    <a:bodyPr/>
+                    <a:lstStyle/>
+                    <a:p>
+                      <a:r>
+                        <a:rPr lang="en-US" sz="2800" b="1" dirty="0"/>
+                        <a:t>Thesis</a:t>
+                      </a:r>
+                    </a:p>
+                  </a:txBody>
+                  <a:tcPr/>
+                </a:tc>
+                <a:tc>
+                  <a:txBody>
+                    <a:bodyPr/>
+                    <a:lstStyle/>
+                    <a:p>
+                      <a:r>
+                        <a:rPr lang="en-US" sz="2800" dirty="0"/>
+                        <a:t>Nov 4</a:t>
+                      </a:r>
+                      <a:r>
+                        <a:rPr lang="en-US" sz="2800" baseline="30000" dirty="0"/>
+                        <a:t>th</a:t>
+                      </a:r>
+                      <a:endParaRPr lang="en-US" sz="2800" dirty="0"/>
+                    </a:p>
+                  </a:txBody>
+                  <a:tcPr/>
+                </a:tc>
+                <a:extLst>
+                  <a:ext uri="{0D108BD9-81ED-4DB2-BD59-A6C34878D82A}">
+                    <a16:rowId xmlns:a16="http://schemas.microsoft.com/office/drawing/2014/main" val="774771326"/>
+                  </a:ext>
+                </a:extLst>
+              </a:tr>
+            </a:tbl>
+          </a:graphicData>
+        </a:graphic>
+      </p:graphicFrame>
+      <p:sp>
+        <p:nvSpPr>
+          <p:cNvPr id="3" name="Slide Number Placeholder 2">
+            <a:extLst>
+              <a:ext uri="{FF2B5EF4-FFF2-40B4-BE49-F238E27FC236}">
+                <a16:creationId xmlns:a16="http://schemas.microsoft.com/office/drawing/2014/main" id="{5C6931E4-5664-0265-F5EE-7AF50CE0C266}"/>
+              </a:ext>
+            </a:extLst>
+          </p:cNvPr>
+          <p:cNvSpPr>
+            <a:spLocks noGrp="1"/>
+          </p:cNvSpPr>
+          <p:nvPr>
+            <p:ph type="sldNum" sz="quarter" idx="12"/>
+          </p:nvPr>
+        </p:nvSpPr>
+        <p:spPr/>
+        <p:txBody>
+          <a:bodyPr/>
+          <a:lstStyle/>
+          <a:p>
+            <a:fld id="{029AB40E-1F3D-A54A-8158-3F2FE1271995}" type="slidenum">
+              <a:rPr lang="en-US" smtClean="0"/>
+              <a:t>13</a:t>
+            </a:fld>
+            <a:endParaRPr lang="en-US"/>
+          </a:p>
+        </p:txBody>
+      </p:sp>
+    </p:spTree>
+    <p:extLst>
+      <p:ext uri="{BB962C8B-B14F-4D97-AF65-F5344CB8AC3E}">
+        <p14:creationId xmlns:p14="http://schemas.microsoft.com/office/powerpoint/2010/main" val="3251045547"/>
+      </p:ext>
+    </p:extLst>
+  </p:cSld>
+  <p:clrMapOvr>
+    <a:masterClrMapping/>
+  </p:clrMapOvr>
+</p:sld>
+</file>
+
+<file path=ppt/slides/slide14.xml><?xml version="1.0" encoding="utf-8"?>
+<p:sld xmlns:a="http://schemas.openxmlformats.org/drawingml/2006/main" xmlns:r="http://schemas.openxmlformats.org/officeDocument/2006/relationships" xmlns:p="http://schemas.openxmlformats.org/presentationml/2006/main">
+  <p:cSld>
+    <p:spTree>
+      <p:nvGrpSpPr>
+        <p:cNvPr id="1" name=""/>
+        <p:cNvGrpSpPr/>
+        <p:nvPr/>
+      </p:nvGrpSpPr>
+      <p:grpSpPr>
+        <a:xfrm>
+          <a:off x="0" y="0"/>
+          <a:ext cx="0" cy="0"/>
+          <a:chOff x="0" y="0"/>
+          <a:chExt cx="0" cy="0"/>
+        </a:xfrm>
+      </p:grpSpPr>
+      <p:sp>
+        <p:nvSpPr>
+          <p:cNvPr id="2" name="Title 1">
+            <a:extLst>
+              <a:ext uri="{FF2B5EF4-FFF2-40B4-BE49-F238E27FC236}">
+                <a16:creationId xmlns:a16="http://schemas.microsoft.com/office/drawing/2014/main" id="{1B0F7064-333F-6552-77BA-A2F7D53172A6}"/>
+              </a:ext>
+            </a:extLst>
+          </p:cNvPr>
+          <p:cNvSpPr>
+            <a:spLocks noGrp="1"/>
+          </p:cNvSpPr>
+          <p:nvPr>
+            <p:ph type="title"/>
+          </p:nvPr>
+        </p:nvSpPr>
+        <p:spPr>
+          <a:xfrm>
+            <a:off x="838199" y="424543"/>
+            <a:ext cx="10168467" cy="1266145"/>
+          </a:xfrm>
+        </p:spPr>
+        <p:txBody>
+          <a:bodyPr>
+            <a:normAutofit/>
+          </a:bodyPr>
+          <a:lstStyle/>
+          <a:p>
+            <a:r>
+              <a:rPr lang="en-US" dirty="0"/>
+              <a:t>Progress So Far…</a:t>
+            </a:r>
+          </a:p>
+        </p:txBody>
+      </p:sp>
+      <p:sp>
+        <p:nvSpPr>
+          <p:cNvPr id="3" name="Content Placeholder 2">
+            <a:extLst>
+              <a:ext uri="{FF2B5EF4-FFF2-40B4-BE49-F238E27FC236}">
+                <a16:creationId xmlns:a16="http://schemas.microsoft.com/office/drawing/2014/main" id="{EC225547-4E3B-2555-E65D-E3E576CA9034}"/>
+              </a:ext>
+            </a:extLst>
+          </p:cNvPr>
+          <p:cNvSpPr>
+            <a:spLocks noGrp="1"/>
+          </p:cNvSpPr>
+          <p:nvPr>
+            <p:ph idx="1"/>
+          </p:nvPr>
+        </p:nvSpPr>
+        <p:spPr>
+          <a:xfrm>
+            <a:off x="838200" y="1542814"/>
+            <a:ext cx="10515600" cy="2522437"/>
+          </a:xfrm>
+        </p:spPr>
+        <p:txBody>
+          <a:bodyPr>
+            <a:normAutofit/>
+          </a:bodyPr>
+          <a:lstStyle/>
+          <a:p>
+            <a:r>
+              <a:rPr lang="en-US" dirty="0"/>
+              <a:t>The test bed is done (only virtually)</a:t>
+            </a:r>
+          </a:p>
+          <a:p>
+            <a:pPr lvl="1"/>
+            <a:r>
+              <a:rPr lang="en-US" dirty="0"/>
+              <a:t>Image and container deployment for clients and mimic SCPNS</a:t>
+            </a:r>
+          </a:p>
+          <a:p>
+            <a:r>
+              <a:rPr lang="en-US" dirty="0"/>
+              <a:t>Image: “</a:t>
+            </a:r>
+            <a:r>
+              <a:rPr lang="en-US" dirty="0" err="1"/>
+              <a:t>debian:stable-slim</a:t>
+            </a:r>
+            <a:r>
+              <a:rPr lang="en-US" dirty="0"/>
+              <a:t>” (~150Mb)</a:t>
+            </a:r>
+          </a:p>
+          <a:p>
+            <a:r>
+              <a:rPr lang="en-US" dirty="0"/>
+              <a:t>Both run a simple networking/encryption bash script</a:t>
+            </a:r>
+          </a:p>
+          <a:p>
+            <a:r>
+              <a:rPr lang="en-US" dirty="0"/>
+              <a:t>Microk8s dashboard add-on</a:t>
+            </a:r>
+          </a:p>
+          <a:p>
+            <a:pPr marL="0" indent="0">
+              <a:buNone/>
+            </a:pPr>
+            <a:endParaRPr lang="en-US" dirty="0"/>
+          </a:p>
+          <a:p>
+            <a:endParaRPr lang="en-US" dirty="0"/>
+          </a:p>
+          <a:p>
+            <a:endParaRPr lang="en-US" dirty="0"/>
+          </a:p>
+        </p:txBody>
+      </p:sp>
+      <p:sp>
+        <p:nvSpPr>
+          <p:cNvPr id="4" name="Slide Number Placeholder 3">
+            <a:extLst>
+              <a:ext uri="{FF2B5EF4-FFF2-40B4-BE49-F238E27FC236}">
+                <a16:creationId xmlns:a16="http://schemas.microsoft.com/office/drawing/2014/main" id="{03434EA5-297A-7F49-1941-C30BBC3B40F7}"/>
+              </a:ext>
+            </a:extLst>
+          </p:cNvPr>
+          <p:cNvSpPr>
+            <a:spLocks noGrp="1"/>
+          </p:cNvSpPr>
+          <p:nvPr>
+            <p:ph type="sldNum" sz="quarter" idx="12"/>
+          </p:nvPr>
+        </p:nvSpPr>
+        <p:spPr/>
+        <p:txBody>
+          <a:bodyPr/>
+          <a:lstStyle/>
+          <a:p>
+            <a:fld id="{029AB40E-1F3D-A54A-8158-3F2FE1271995}" type="slidenum">
+              <a:rPr lang="en-US" smtClean="0"/>
+              <a:t>14</a:t>
+            </a:fld>
+            <a:endParaRPr lang="en-US"/>
+          </a:p>
+        </p:txBody>
+      </p:sp>
+      <p:pic>
+        <p:nvPicPr>
+          <p:cNvPr id="10" name="Picture 9">
+            <a:extLst>
+              <a:ext uri="{FF2B5EF4-FFF2-40B4-BE49-F238E27FC236}">
+                <a16:creationId xmlns:a16="http://schemas.microsoft.com/office/drawing/2014/main" id="{B48B15EF-DA56-12B0-874A-B109DDD12D8C}"/>
+              </a:ext>
+            </a:extLst>
+          </p:cNvPr>
+          <p:cNvPicPr>
+            <a:picLocks noChangeAspect="1"/>
+          </p:cNvPicPr>
+          <p:nvPr/>
+        </p:nvPicPr>
+        <p:blipFill>
+          <a:blip r:embed="rId3"/>
+          <a:stretch>
+            <a:fillRect/>
+          </a:stretch>
+        </p:blipFill>
+        <p:spPr>
+          <a:xfrm>
+            <a:off x="418292" y="4269810"/>
+            <a:ext cx="11355416" cy="2020878"/>
+          </a:xfrm>
+          <a:prstGeom prst="rect">
+            <a:avLst/>
+          </a:prstGeom>
+        </p:spPr>
+      </p:pic>
+      <p:sp>
+        <p:nvSpPr>
+          <p:cNvPr id="12" name="TextBox 11">
+            <a:extLst>
+              <a:ext uri="{FF2B5EF4-FFF2-40B4-BE49-F238E27FC236}">
+                <a16:creationId xmlns:a16="http://schemas.microsoft.com/office/drawing/2014/main" id="{10C48575-4F4A-54FA-F6CC-2ADF70B1CAC0}"/>
+              </a:ext>
+            </a:extLst>
+          </p:cNvPr>
+          <p:cNvSpPr txBox="1"/>
+          <p:nvPr/>
+        </p:nvSpPr>
+        <p:spPr>
+          <a:xfrm>
+            <a:off x="979185" y="6325472"/>
+            <a:ext cx="9886494" cy="461665"/>
+          </a:xfrm>
+          <a:prstGeom prst="rect">
+            <a:avLst/>
+          </a:prstGeom>
+          <a:noFill/>
+        </p:spPr>
+        <p:txBody>
+          <a:bodyPr wrap="square" rtlCol="0">
+            <a:spAutoFit/>
+          </a:bodyPr>
+          <a:lstStyle/>
+          <a:p>
+            <a:pPr algn="ctr"/>
+            <a:r>
+              <a:rPr lang="en-US" sz="2400" dirty="0"/>
+              <a:t>From running 5 clients, 1 server</a:t>
+            </a:r>
+          </a:p>
+        </p:txBody>
+      </p:sp>
+    </p:spTree>
+    <p:extLst>
+      <p:ext uri="{BB962C8B-B14F-4D97-AF65-F5344CB8AC3E}">
+        <p14:creationId xmlns:p14="http://schemas.microsoft.com/office/powerpoint/2010/main" val="2529734131"/>
+      </p:ext>
+    </p:extLst>
+  </p:cSld>
+  <p:clrMapOvr>
+    <a:masterClrMapping/>
+  </p:clrMapOvr>
+</p:sld>
+</file>
+
+<file path=ppt/slides/slide15.xml><?xml version="1.0" encoding="utf-8"?>
+<p:sld xmlns:a="http://schemas.openxmlformats.org/drawingml/2006/main" xmlns:r="http://schemas.openxmlformats.org/officeDocument/2006/relationships" xmlns:p="http://schemas.openxmlformats.org/presentationml/2006/main">
+  <p:cSld>
+    <p:spTree>
+      <p:nvGrpSpPr>
+        <p:cNvPr id="1" name=""/>
+        <p:cNvGrpSpPr/>
+        <p:nvPr/>
+      </p:nvGrpSpPr>
+      <p:grpSpPr>
+        <a:xfrm>
+          <a:off x="0" y="0"/>
+          <a:ext cx="0" cy="0"/>
+          <a:chOff x="0" y="0"/>
+          <a:chExt cx="0" cy="0"/>
+        </a:xfrm>
+      </p:grpSpPr>
+      <p:sp>
+        <p:nvSpPr>
+          <p:cNvPr id="2" name="Title 1">
+            <a:extLst>
+              <a:ext uri="{FF2B5EF4-FFF2-40B4-BE49-F238E27FC236}">
+                <a16:creationId xmlns:a16="http://schemas.microsoft.com/office/drawing/2014/main" id="{69064BA8-5CCF-FA88-FF89-5D8C5B0C99C5}"/>
+              </a:ext>
+            </a:extLst>
+          </p:cNvPr>
+          <p:cNvSpPr>
+            <a:spLocks noGrp="1"/>
+          </p:cNvSpPr>
+          <p:nvPr>
+            <p:ph type="title"/>
+          </p:nvPr>
+        </p:nvSpPr>
+        <p:spPr/>
+        <p:txBody>
+          <a:bodyPr/>
+          <a:lstStyle/>
+          <a:p>
+            <a:r>
+              <a:rPr lang="en-US" dirty="0"/>
+              <a:t>Challenges</a:t>
+            </a:r>
+          </a:p>
+        </p:txBody>
+      </p:sp>
+      <p:sp>
+        <p:nvSpPr>
+          <p:cNvPr id="3" name="Content Placeholder 2">
+            <a:extLst>
+              <a:ext uri="{FF2B5EF4-FFF2-40B4-BE49-F238E27FC236}">
+                <a16:creationId xmlns:a16="http://schemas.microsoft.com/office/drawing/2014/main" id="{3F666CB8-410E-8FE2-A87A-F19834842278}"/>
+              </a:ext>
+            </a:extLst>
+          </p:cNvPr>
+          <p:cNvSpPr>
+            <a:spLocks noGrp="1"/>
+          </p:cNvSpPr>
+          <p:nvPr>
+            <p:ph idx="1"/>
+          </p:nvPr>
+        </p:nvSpPr>
+        <p:spPr/>
+        <p:txBody>
+          <a:bodyPr/>
+          <a:lstStyle/>
+          <a:p>
+            <a:r>
+              <a:rPr lang="en-US" dirty="0"/>
+              <a:t>How will the networking core on the SCPNS handle multiple connections?</a:t>
+            </a:r>
+          </a:p>
+        </p:txBody>
+      </p:sp>
+      <p:sp>
+        <p:nvSpPr>
+          <p:cNvPr id="4" name="Slide Number Placeholder 3">
+            <a:extLst>
+              <a:ext uri="{FF2B5EF4-FFF2-40B4-BE49-F238E27FC236}">
+                <a16:creationId xmlns:a16="http://schemas.microsoft.com/office/drawing/2014/main" id="{CBC051FD-A267-811E-867C-74B3759BF6B5}"/>
+              </a:ext>
+            </a:extLst>
+          </p:cNvPr>
+          <p:cNvSpPr>
+            <a:spLocks noGrp="1"/>
+          </p:cNvSpPr>
+          <p:nvPr>
+            <p:ph type="sldNum" sz="quarter" idx="12"/>
+          </p:nvPr>
+        </p:nvSpPr>
+        <p:spPr/>
+        <p:txBody>
+          <a:bodyPr/>
+          <a:lstStyle/>
+          <a:p>
+            <a:fld id="{029AB40E-1F3D-A54A-8158-3F2FE1271995}" type="slidenum">
+              <a:rPr lang="en-US" smtClean="0"/>
+              <a:t>15</a:t>
+            </a:fld>
+            <a:endParaRPr lang="en-US"/>
+          </a:p>
+        </p:txBody>
+      </p:sp>
+    </p:spTree>
+    <p:extLst>
+      <p:ext uri="{BB962C8B-B14F-4D97-AF65-F5344CB8AC3E}">
+        <p14:creationId xmlns:p14="http://schemas.microsoft.com/office/powerpoint/2010/main" val="3296855830"/>
       </p:ext>
     </p:extLst>
   </p:cSld>
@@ -3542,7 +5970,7 @@
           <p:cNvPr id="2" name="Title 1">
             <a:extLst>
               <a:ext uri="{FF2B5EF4-FFF2-40B4-BE49-F238E27FC236}">
-                <a16:creationId xmlns:a16="http://schemas.microsoft.com/office/drawing/2014/main" id="{D9C95879-B210-160E-D95D-2FE8A190F663}"/>
+                <a16:creationId xmlns:a16="http://schemas.microsoft.com/office/drawing/2014/main" id="{C9316C8E-DD3C-E892-8644-3B554CB75957}"/>
               </a:ext>
             </a:extLst>
           </p:cNvPr>
@@ -3558,45 +5986,134 @@
           <a:bodyPr/>
           <a:lstStyle/>
           <a:p>
+            <a:r>
+              <a:rPr lang="en-US" dirty="0"/>
+              <a:t>Contents</a:t>
+            </a:r>
+          </a:p>
+        </p:txBody>
+      </p:sp>
+      <p:sp>
+        <p:nvSpPr>
+          <p:cNvPr id="3" name="Content Placeholder 2">
+            <a:extLst>
+              <a:ext uri="{FF2B5EF4-FFF2-40B4-BE49-F238E27FC236}">
+                <a16:creationId xmlns:a16="http://schemas.microsoft.com/office/drawing/2014/main" id="{76BCFAE5-1EF7-CDA5-D611-41CA127E0B20}"/>
+              </a:ext>
+            </a:extLst>
+          </p:cNvPr>
+          <p:cNvSpPr>
+            <a:spLocks noGrp="1"/>
+          </p:cNvSpPr>
+          <p:nvPr>
+            <p:ph idx="1"/>
+          </p:nvPr>
+        </p:nvSpPr>
+        <p:spPr/>
+        <p:txBody>
+          <a:bodyPr/>
+          <a:lstStyle/>
+          <a:p>
+            <a:pPr marL="514350" indent="-514350">
+              <a:buAutoNum type="arabicPeriod"/>
+            </a:pPr>
             <a:r>
               <a:rPr lang="en-US" dirty="0"/>
               <a:t>Topic Definition</a:t>
             </a:r>
           </a:p>
-        </p:txBody>
-      </p:sp>
-      <p:sp>
-        <p:nvSpPr>
-          <p:cNvPr id="3" name="Content Placeholder 2">
-            <a:extLst>
-              <a:ext uri="{FF2B5EF4-FFF2-40B4-BE49-F238E27FC236}">
-                <a16:creationId xmlns:a16="http://schemas.microsoft.com/office/drawing/2014/main" id="{12A99035-87EE-068B-D59C-B635C7445EEF}"/>
-              </a:ext>
-            </a:extLst>
-          </p:cNvPr>
-          <p:cNvSpPr>
-            <a:spLocks noGrp="1"/>
-          </p:cNvSpPr>
-          <p:nvPr>
-            <p:ph idx="1"/>
-          </p:nvPr>
-        </p:nvSpPr>
-        <p:spPr/>
-        <p:txBody>
-          <a:bodyPr/>
-          <a:lstStyle/>
-          <a:p>
-            <a:pPr marL="0" indent="0">
-              <a:buNone/>
+          <a:p>
+            <a:pPr marL="514350" indent="-514350">
+              <a:buAutoNum type="arabicPeriod"/>
+            </a:pPr>
+            <a:r>
+              <a:rPr lang="en-US" dirty="0"/>
+              <a:t>Aim’s and KPI</a:t>
+            </a:r>
+          </a:p>
+          <a:p>
+            <a:pPr marL="514350" indent="-514350">
+              <a:buAutoNum type="arabicPeriod"/>
+            </a:pPr>
+            <a:r>
+              <a:rPr lang="en-US" dirty="0"/>
+              <a:t>Hardware Overview</a:t>
+            </a:r>
+          </a:p>
+          <a:p>
+            <a:pPr marL="514350" indent="-514350">
+              <a:buAutoNum type="arabicPeriod"/>
+            </a:pPr>
+            <a:r>
+              <a:rPr lang="en-US" dirty="0"/>
+              <a:t>Network Testbed Overview</a:t>
+            </a:r>
+          </a:p>
+          <a:p>
+            <a:pPr marL="514350" indent="-514350">
+              <a:buAutoNum type="arabicPeriod"/>
+            </a:pPr>
+            <a:r>
+              <a:rPr lang="en-US" dirty="0"/>
+              <a:t>Project Plan</a:t>
+            </a:r>
+          </a:p>
+          <a:p>
+            <a:pPr marL="514350" indent="-514350">
+              <a:buAutoNum type="arabicPeriod"/>
+            </a:pPr>
+            <a:r>
+              <a:rPr lang="en-US" dirty="0"/>
+              <a:t>Progress so Far</a:t>
+            </a:r>
+          </a:p>
+          <a:p>
+            <a:pPr marL="514350" indent="-514350">
+              <a:buAutoNum type="arabicPeriod"/>
             </a:pPr>
             <a:endParaRPr lang="en-US" dirty="0"/>
+          </a:p>
+          <a:p>
+            <a:pPr marL="514350" indent="-514350">
+              <a:buAutoNum type="arabicPeriod"/>
+            </a:pPr>
+            <a:endParaRPr lang="en-US" dirty="0"/>
+          </a:p>
+        </p:txBody>
+      </p:sp>
+      <p:sp>
+        <p:nvSpPr>
+          <p:cNvPr id="4" name="Slide Number Placeholder 3">
+            <a:extLst>
+              <a:ext uri="{FF2B5EF4-FFF2-40B4-BE49-F238E27FC236}">
+                <a16:creationId xmlns:a16="http://schemas.microsoft.com/office/drawing/2014/main" id="{F80D2BD2-86E0-DE12-1537-08DB81947F26}"/>
+              </a:ext>
+            </a:extLst>
+          </p:cNvPr>
+          <p:cNvSpPr>
+            <a:spLocks noGrp="1"/>
+          </p:cNvSpPr>
+          <p:nvPr>
+            <p:ph type="sldNum" sz="quarter" idx="12"/>
+          </p:nvPr>
+        </p:nvSpPr>
+        <p:spPr/>
+        <p:txBody>
+          <a:bodyPr/>
+          <a:lstStyle/>
+          <a:p>
+            <a:fld id="{029AB40E-1F3D-A54A-8158-3F2FE1271995}" type="slidenum">
+              <a:rPr lang="en-US" smtClean="0"/>
+              <a:t>2</a:t>
+            </a:fld>
+            <a:endParaRPr lang="en-US"/>
           </a:p>
         </p:txBody>
       </p:sp>
     </p:spTree>
     <p:extLst>
       <p:ext uri="{BB962C8B-B14F-4D97-AF65-F5344CB8AC3E}">
-        <p14:creationId xmlns:p14="http://schemas.microsoft.com/office/powerpoint/2010/main" val="2153186563"/>
+        <p14:creationId xmlns:p14="http://schemas.microsoft.com/office/powerpoint/2010/main" val="1573902335"/>
       </p:ext>
     </p:extLst>
   </p:cSld>
@@ -3628,7 +6145,7 @@
           <p:cNvPr id="2" name="Title 1">
             <a:extLst>
               <a:ext uri="{FF2B5EF4-FFF2-40B4-BE49-F238E27FC236}">
-                <a16:creationId xmlns:a16="http://schemas.microsoft.com/office/drawing/2014/main" id="{EC02ABA4-5AB6-92BD-07BD-2A3E8B7EE307}"/>
+                <a16:creationId xmlns:a16="http://schemas.microsoft.com/office/drawing/2014/main" id="{D9C95879-B210-160E-D95D-2FE8A190F663}"/>
               </a:ext>
             </a:extLst>
           </p:cNvPr>
@@ -3646,7 +6163,7 @@
           <a:p>
             <a:r>
               <a:rPr lang="en-US" dirty="0"/>
-              <a:t>Aims and KPI</a:t>
+              <a:t>Topic Definition</a:t>
             </a:r>
           </a:p>
         </p:txBody>
@@ -3656,7 +6173,7 @@
           <p:cNvPr id="3" name="Content Placeholder 2">
             <a:extLst>
               <a:ext uri="{FF2B5EF4-FFF2-40B4-BE49-F238E27FC236}">
-                <a16:creationId xmlns:a16="http://schemas.microsoft.com/office/drawing/2014/main" id="{779D05C7-FB6C-7988-4047-248469C801B8}"/>
+                <a16:creationId xmlns:a16="http://schemas.microsoft.com/office/drawing/2014/main" id="{12A99035-87EE-068B-D59C-B635C7445EEF}"/>
               </a:ext>
             </a:extLst>
           </p:cNvPr>
@@ -3667,11 +6184,141 @@
             <p:ph idx="1"/>
           </p:nvPr>
         </p:nvSpPr>
+        <p:spPr>
+          <a:xfrm>
+            <a:off x="838200" y="1847850"/>
+            <a:ext cx="10515600" cy="4351338"/>
+          </a:xfrm>
+        </p:spPr>
+        <p:txBody>
+          <a:bodyPr>
+            <a:normAutofit fontScale="92500" lnSpcReduction="10000"/>
+          </a:bodyPr>
+          <a:lstStyle/>
+          <a:p>
+            <a:pPr marL="0" indent="0" algn="ctr">
+              <a:buNone/>
+            </a:pPr>
+            <a:r>
+              <a:rPr lang="en-US" sz="3200" dirty="0"/>
+              <a:t>Goal: Design a mutable, FPGA-based, edge device that </a:t>
+            </a:r>
+            <a:r>
+              <a:rPr lang="en-US" sz="3200" i="1" dirty="0" err="1"/>
+              <a:t>emphasises</a:t>
+            </a:r>
+            <a:r>
+              <a:rPr lang="en-US" sz="3200" dirty="0"/>
+              <a:t> network security.</a:t>
+            </a:r>
+          </a:p>
+          <a:p>
+            <a:endParaRPr lang="en-US" b="1" dirty="0"/>
+          </a:p>
+          <a:p>
+            <a:r>
+              <a:rPr lang="en-US" dirty="0"/>
+              <a:t>FPGA-Based RISC-V softcore processor running zephyr</a:t>
+            </a:r>
+            <a:endParaRPr lang="en-US" b="1" dirty="0"/>
+          </a:p>
+          <a:p>
+            <a:pPr lvl="1"/>
+            <a:r>
+              <a:rPr lang="en-US" b="1" dirty="0"/>
+              <a:t>S</a:t>
+            </a:r>
+            <a:r>
+              <a:rPr lang="en-US" dirty="0"/>
+              <a:t>oft </a:t>
+            </a:r>
+            <a:r>
+              <a:rPr lang="en-US" b="1" dirty="0"/>
+              <a:t>C</a:t>
+            </a:r>
+            <a:r>
+              <a:rPr lang="en-US" dirty="0"/>
+              <a:t>ore </a:t>
+            </a:r>
+            <a:r>
+              <a:rPr lang="en-US" b="1" dirty="0"/>
+              <a:t>P</a:t>
+            </a:r>
+            <a:r>
+              <a:rPr lang="en-US" dirty="0"/>
+              <a:t>rocessor for </a:t>
+            </a:r>
+            <a:r>
+              <a:rPr lang="en-US" b="1" dirty="0"/>
+              <a:t>N</a:t>
+            </a:r>
+            <a:r>
+              <a:rPr lang="en-US" dirty="0"/>
+              <a:t>etwork </a:t>
+            </a:r>
+            <a:r>
+              <a:rPr lang="en-US" b="1" dirty="0"/>
+              <a:t>S</a:t>
+            </a:r>
+            <a:r>
+              <a:rPr lang="en-US" dirty="0"/>
+              <a:t>ecurity – S.C.P.N.S</a:t>
+            </a:r>
+          </a:p>
+          <a:p>
+            <a:endParaRPr lang="en-US" dirty="0"/>
+          </a:p>
+          <a:p>
+            <a:r>
+              <a:rPr lang="en-US" dirty="0"/>
+              <a:t>Mutable – Can run an application in parallel with networking (within reason)</a:t>
+            </a:r>
+          </a:p>
+          <a:p>
+            <a:r>
+              <a:rPr lang="en-US" dirty="0"/>
+              <a:t>A chosen network security method</a:t>
+            </a:r>
+          </a:p>
+          <a:p>
+            <a:r>
+              <a:rPr lang="en-US" dirty="0"/>
+              <a:t>Networking testbed, via Kubernetes</a:t>
+            </a:r>
+          </a:p>
+          <a:p>
+            <a:pPr marL="0" indent="0" algn="ctr">
+              <a:buNone/>
+            </a:pPr>
+            <a:endParaRPr lang="en-US" sz="3200" dirty="0"/>
+          </a:p>
+        </p:txBody>
+      </p:sp>
+      <p:sp>
+        <p:nvSpPr>
+          <p:cNvPr id="4" name="Slide Number Placeholder 3">
+            <a:extLst>
+              <a:ext uri="{FF2B5EF4-FFF2-40B4-BE49-F238E27FC236}">
+                <a16:creationId xmlns:a16="http://schemas.microsoft.com/office/drawing/2014/main" id="{6DFD9379-DC09-43BB-9933-FF45430B2548}"/>
+              </a:ext>
+            </a:extLst>
+          </p:cNvPr>
+          <p:cNvSpPr>
+            <a:spLocks noGrp="1"/>
+          </p:cNvSpPr>
+          <p:nvPr>
+            <p:ph type="sldNum" sz="quarter" idx="12"/>
+          </p:nvPr>
+        </p:nvSpPr>
         <p:spPr/>
         <p:txBody>
           <a:bodyPr/>
           <a:lstStyle/>
           <a:p>
+            <a:fld id="{029AB40E-1F3D-A54A-8158-3F2FE1271995}" type="slidenum">
+              <a:rPr lang="en-US" smtClean="0"/>
+              <a:t>3</a:t>
+            </a:fld>
             <a:endParaRPr lang="en-US"/>
           </a:p>
         </p:txBody>
@@ -3679,7 +6326,7 @@
     </p:spTree>
     <p:extLst>
       <p:ext uri="{BB962C8B-B14F-4D97-AF65-F5344CB8AC3E}">
-        <p14:creationId xmlns:p14="http://schemas.microsoft.com/office/powerpoint/2010/main" val="4132564965"/>
+        <p14:creationId xmlns:p14="http://schemas.microsoft.com/office/powerpoint/2010/main" val="2153186563"/>
       </p:ext>
     </p:extLst>
   </p:cSld>
@@ -3711,7 +6358,7 @@
           <p:cNvPr id="2" name="Title 1">
             <a:extLst>
               <a:ext uri="{FF2B5EF4-FFF2-40B4-BE49-F238E27FC236}">
-                <a16:creationId xmlns:a16="http://schemas.microsoft.com/office/drawing/2014/main" id="{D52DCEE9-0017-3A21-C80B-968F0BD7DB92}"/>
+                <a16:creationId xmlns:a16="http://schemas.microsoft.com/office/drawing/2014/main" id="{EC02ABA4-5AB6-92BD-07BD-2A3E8B7EE307}"/>
               </a:ext>
             </a:extLst>
           </p:cNvPr>
@@ -3729,25 +6376,279 @@
           <a:p>
             <a:r>
               <a:rPr lang="en-US" dirty="0"/>
-              <a:t>Background</a:t>
-            </a:r>
-          </a:p>
-        </p:txBody>
-      </p:sp>
-      <p:sp>
-        <p:nvSpPr>
-          <p:cNvPr id="3" name="Content Placeholder 2">
-            <a:extLst>
-              <a:ext uri="{FF2B5EF4-FFF2-40B4-BE49-F238E27FC236}">
-                <a16:creationId xmlns:a16="http://schemas.microsoft.com/office/drawing/2014/main" id="{4B0F8DA9-168D-4F3A-D557-A6ECE661027B}"/>
-              </a:ext>
-            </a:extLst>
-          </p:cNvPr>
-          <p:cNvSpPr>
-            <a:spLocks noGrp="1"/>
-          </p:cNvSpPr>
+              <a:t>Aims and KPI</a:t>
+            </a:r>
+          </a:p>
+        </p:txBody>
+      </p:sp>
+      <p:graphicFrame>
+        <p:nvGraphicFramePr>
+          <p:cNvPr id="4" name="Content Placeholder 3">
+            <a:extLst>
+              <a:ext uri="{FF2B5EF4-FFF2-40B4-BE49-F238E27FC236}">
+                <a16:creationId xmlns:a16="http://schemas.microsoft.com/office/drawing/2014/main" id="{AD338430-82DC-364E-6D68-DCCDF4412687}"/>
+              </a:ext>
+            </a:extLst>
+          </p:cNvPr>
+          <p:cNvGraphicFramePr>
+            <a:graphicFrameLocks noGrp="1"/>
+          </p:cNvGraphicFramePr>
           <p:nvPr>
             <p:ph idx="1"/>
+            <p:extLst>
+              <p:ext uri="{D42A27DB-BD31-4B8C-83A1-F6EECF244321}">
+                <p14:modId xmlns:p14="http://schemas.microsoft.com/office/powerpoint/2010/main" val="2069859737"/>
+              </p:ext>
+            </p:extLst>
+          </p:nvPr>
+        </p:nvGraphicFramePr>
+        <p:xfrm>
+          <a:off x="631371" y="2057400"/>
+          <a:ext cx="10929258" cy="3108960"/>
+        </p:xfrm>
+        <a:graphic>
+          <a:graphicData uri="http://schemas.openxmlformats.org/drawingml/2006/table">
+            <a:tbl>
+              <a:tblPr firstRow="1" bandRow="1" bandCol="1">
+                <a:tableStyleId>{9D7B26C5-4107-4FEC-AEDC-1716B250A1EF}</a:tableStyleId>
+              </a:tblPr>
+              <a:tblGrid>
+                <a:gridCol w="2991336">
+                  <a:extLst>
+                    <a:ext uri="{9D8B030D-6E8A-4147-A177-3AD203B41FA5}">
+                      <a16:colId xmlns:a16="http://schemas.microsoft.com/office/drawing/2014/main" val="2406295225"/>
+                    </a:ext>
+                  </a:extLst>
+                </a:gridCol>
+                <a:gridCol w="7937922">
+                  <a:extLst>
+                    <a:ext uri="{9D8B030D-6E8A-4147-A177-3AD203B41FA5}">
+                      <a16:colId xmlns:a16="http://schemas.microsoft.com/office/drawing/2014/main" val="1284868456"/>
+                    </a:ext>
+                  </a:extLst>
+                </a:gridCol>
+              </a:tblGrid>
+              <a:tr h="370840">
+                <a:tc>
+                  <a:txBody>
+                    <a:bodyPr/>
+                    <a:lstStyle/>
+                    <a:p>
+                      <a:r>
+                        <a:rPr lang="en-US" sz="2400" dirty="0"/>
+                        <a:t>Aims</a:t>
+                      </a:r>
+                    </a:p>
+                  </a:txBody>
+                  <a:tcPr/>
+                </a:tc>
+                <a:tc>
+                  <a:txBody>
+                    <a:bodyPr/>
+                    <a:lstStyle/>
+                    <a:p>
+                      <a:r>
+                        <a:rPr lang="en-US" sz="2400" dirty="0"/>
+                        <a:t>Performance Indicator</a:t>
+                      </a:r>
+                    </a:p>
+                  </a:txBody>
+                  <a:tcPr/>
+                </a:tc>
+                <a:extLst>
+                  <a:ext uri="{0D108BD9-81ED-4DB2-BD59-A6C34878D82A}">
+                    <a16:rowId xmlns:a16="http://schemas.microsoft.com/office/drawing/2014/main" val="2204279896"/>
+                  </a:ext>
+                </a:extLst>
+              </a:tr>
+              <a:tr h="370840">
+                <a:tc>
+                  <a:txBody>
+                    <a:bodyPr/>
+                    <a:lstStyle/>
+                    <a:p>
+                      <a:r>
+                        <a:rPr lang="en-US" sz="2400" dirty="0"/>
+                        <a:t>Network Securable</a:t>
+                      </a:r>
+                    </a:p>
+                  </a:txBody>
+                  <a:tcPr/>
+                </a:tc>
+                <a:tc>
+                  <a:txBody>
+                    <a:bodyPr/>
+                    <a:lstStyle/>
+                    <a:p>
+                      <a:r>
+                        <a:rPr lang="en-US" sz="2400" dirty="0"/>
+                        <a:t>Packet sniffing, interception testing</a:t>
+                      </a:r>
+                    </a:p>
+                  </a:txBody>
+                  <a:tcPr/>
+                </a:tc>
+                <a:extLst>
+                  <a:ext uri="{0D108BD9-81ED-4DB2-BD59-A6C34878D82A}">
+                    <a16:rowId xmlns:a16="http://schemas.microsoft.com/office/drawing/2014/main" val="3192877105"/>
+                  </a:ext>
+                </a:extLst>
+              </a:tr>
+              <a:tr h="370840">
+                <a:tc>
+                  <a:txBody>
+                    <a:bodyPr/>
+                    <a:lstStyle/>
+                    <a:p>
+                      <a:r>
+                        <a:rPr lang="en-US" sz="2400" dirty="0"/>
+                        <a:t>Processing Latency</a:t>
+                      </a:r>
+                    </a:p>
+                  </a:txBody>
+                  <a:tcPr/>
+                </a:tc>
+                <a:tc>
+                  <a:txBody>
+                    <a:bodyPr/>
+                    <a:lstStyle/>
+                    <a:p>
+                      <a:r>
+                        <a:rPr lang="en-US" sz="2400" dirty="0"/>
+                        <a:t>Measure processing speed (speed per packet)</a:t>
+                      </a:r>
+                    </a:p>
+                  </a:txBody>
+                  <a:tcPr/>
+                </a:tc>
+                <a:extLst>
+                  <a:ext uri="{0D108BD9-81ED-4DB2-BD59-A6C34878D82A}">
+                    <a16:rowId xmlns:a16="http://schemas.microsoft.com/office/drawing/2014/main" val="2117384842"/>
+                  </a:ext>
+                </a:extLst>
+              </a:tr>
+              <a:tr h="370840">
+                <a:tc>
+                  <a:txBody>
+                    <a:bodyPr/>
+                    <a:lstStyle/>
+                    <a:p>
+                      <a:r>
+                        <a:rPr lang="en-US" sz="2400" dirty="0"/>
+                        <a:t>Power Efficient</a:t>
+                      </a:r>
+                    </a:p>
+                  </a:txBody>
+                  <a:tcPr/>
+                </a:tc>
+                <a:tc>
+                  <a:txBody>
+                    <a:bodyPr/>
+                    <a:lstStyle/>
+                    <a:p>
+                      <a:r>
+                        <a:rPr lang="en-US" sz="2400" dirty="0"/>
+                        <a:t>Heat emission (power per packet)</a:t>
+                      </a:r>
+                    </a:p>
+                  </a:txBody>
+                  <a:tcPr/>
+                </a:tc>
+                <a:extLst>
+                  <a:ext uri="{0D108BD9-81ED-4DB2-BD59-A6C34878D82A}">
+                    <a16:rowId xmlns:a16="http://schemas.microsoft.com/office/drawing/2014/main" val="167231192"/>
+                  </a:ext>
+                </a:extLst>
+              </a:tr>
+              <a:tr h="370840">
+                <a:tc>
+                  <a:txBody>
+                    <a:bodyPr/>
+                    <a:lstStyle/>
+                    <a:p>
+                      <a:r>
+                        <a:rPr lang="en-US" sz="2400" dirty="0"/>
+                        <a:t>Resource-</a:t>
+                      </a:r>
+                      <a:r>
+                        <a:rPr lang="en-US" sz="2400" dirty="0" err="1"/>
+                        <a:t>minimising</a:t>
+                      </a:r>
+                      <a:endParaRPr lang="en-US" sz="2400" dirty="0"/>
+                    </a:p>
+                  </a:txBody>
+                  <a:tcPr/>
+                </a:tc>
+                <a:tc>
+                  <a:txBody>
+                    <a:bodyPr/>
+                    <a:lstStyle/>
+                    <a:p>
+                      <a:r>
+                        <a:rPr lang="en-US" sz="2400" dirty="0"/>
+                        <a:t>Amount of: LUTs, FFs, RAM usage</a:t>
+                      </a:r>
+                    </a:p>
+                  </a:txBody>
+                  <a:tcPr/>
+                </a:tc>
+                <a:extLst>
+                  <a:ext uri="{0D108BD9-81ED-4DB2-BD59-A6C34878D82A}">
+                    <a16:rowId xmlns:a16="http://schemas.microsoft.com/office/drawing/2014/main" val="3706124903"/>
+                  </a:ext>
+                </a:extLst>
+              </a:tr>
+              <a:tr h="370840">
+                <a:tc>
+                  <a:txBody>
+                    <a:bodyPr/>
+                    <a:lstStyle/>
+                    <a:p>
+                      <a:r>
+                        <a:rPr lang="en-US" sz="2400" dirty="0"/>
+                        <a:t>Scalability</a:t>
+                      </a:r>
+                    </a:p>
+                  </a:txBody>
+                  <a:tcPr/>
+                </a:tc>
+                <a:tc>
+                  <a:txBody>
+                    <a:bodyPr/>
+                    <a:lstStyle/>
+                    <a:p>
+                      <a:r>
+                        <a:rPr lang="en-US" sz="2400" dirty="0"/>
+                        <a:t>Performance impacts once peripherals are added as well as applications running on the FPGA</a:t>
+                      </a:r>
+                    </a:p>
+                  </a:txBody>
+                  <a:tcPr/>
+                </a:tc>
+                <a:extLst>
+                  <a:ext uri="{0D108BD9-81ED-4DB2-BD59-A6C34878D82A}">
+                    <a16:rowId xmlns:a16="http://schemas.microsoft.com/office/drawing/2014/main" val="2716014014"/>
+                  </a:ext>
+                </a:extLst>
+              </a:tr>
+            </a:tbl>
+          </a:graphicData>
+        </a:graphic>
+      </p:graphicFrame>
+      <p:sp>
+        <p:nvSpPr>
+          <p:cNvPr id="3" name="Slide Number Placeholder 2">
+            <a:extLst>
+              <a:ext uri="{FF2B5EF4-FFF2-40B4-BE49-F238E27FC236}">
+                <a16:creationId xmlns:a16="http://schemas.microsoft.com/office/drawing/2014/main" id="{A654C600-56C0-BF25-541D-0CD31CEC389A}"/>
+              </a:ext>
+            </a:extLst>
+          </p:cNvPr>
+          <p:cNvSpPr>
+            <a:spLocks noGrp="1"/>
+          </p:cNvSpPr>
+          <p:nvPr>
+            <p:ph type="sldNum" sz="quarter" idx="12"/>
           </p:nvPr>
         </p:nvSpPr>
         <p:spPr/>
@@ -3755,6 +6656,10 @@
           <a:bodyPr/>
           <a:lstStyle/>
           <a:p>
+            <a:fld id="{029AB40E-1F3D-A54A-8158-3F2FE1271995}" type="slidenum">
+              <a:rPr lang="en-US" smtClean="0"/>
+              <a:t>4</a:t>
+            </a:fld>
             <a:endParaRPr lang="en-US"/>
           </a:p>
         </p:txBody>
@@ -3762,7 +6667,7 @@
     </p:spTree>
     <p:extLst>
       <p:ext uri="{BB962C8B-B14F-4D97-AF65-F5344CB8AC3E}">
-        <p14:creationId xmlns:p14="http://schemas.microsoft.com/office/powerpoint/2010/main" val="2311167744"/>
+        <p14:creationId xmlns:p14="http://schemas.microsoft.com/office/powerpoint/2010/main" val="4132564965"/>
       </p:ext>
     </p:extLst>
   </p:cSld>
@@ -3794,7 +6699,7 @@
           <p:cNvPr id="2" name="Title 1">
             <a:extLst>
               <a:ext uri="{FF2B5EF4-FFF2-40B4-BE49-F238E27FC236}">
-                <a16:creationId xmlns:a16="http://schemas.microsoft.com/office/drawing/2014/main" id="{912F1450-62DD-184A-3B52-33BBCF80DEE7}"/>
+                <a16:creationId xmlns:a16="http://schemas.microsoft.com/office/drawing/2014/main" id="{32CA93F6-6D1F-88C0-9A79-B0162B551E5C}"/>
               </a:ext>
             </a:extLst>
           </p:cNvPr>
@@ -3812,25 +6717,55 @@
           <a:p>
             <a:r>
               <a:rPr lang="en-US" dirty="0"/>
-              <a:t>Literature Review</a:t>
-            </a:r>
-          </a:p>
-        </p:txBody>
-      </p:sp>
-      <p:sp>
-        <p:nvSpPr>
-          <p:cNvPr id="3" name="Content Placeholder 2">
-            <a:extLst>
-              <a:ext uri="{FF2B5EF4-FFF2-40B4-BE49-F238E27FC236}">
-                <a16:creationId xmlns:a16="http://schemas.microsoft.com/office/drawing/2014/main" id="{8ECC346B-9E36-E5C0-8533-2BD0172E52F2}"/>
-              </a:ext>
-            </a:extLst>
-          </p:cNvPr>
-          <p:cNvSpPr>
-            <a:spLocks noGrp="1"/>
-          </p:cNvSpPr>
-          <p:nvPr>
-            <p:ph idx="1"/>
+              <a:t>SCPNS Architecture Overview</a:t>
+            </a:r>
+          </a:p>
+        </p:txBody>
+      </p:sp>
+      <p:pic>
+        <p:nvPicPr>
+          <p:cNvPr id="4" name="Content Placeholder 4" descr="A diagram of a computer hardware system&#10;&#10;Description automatically generated">
+            <a:extLst>
+              <a:ext uri="{FF2B5EF4-FFF2-40B4-BE49-F238E27FC236}">
+                <a16:creationId xmlns:a16="http://schemas.microsoft.com/office/drawing/2014/main" id="{430E9C94-0A3D-1E6B-1C9C-2FDD46E68E1E}"/>
+              </a:ext>
+            </a:extLst>
+          </p:cNvPr>
+          <p:cNvPicPr>
+            <a:picLocks noChangeAspect="1"/>
+          </p:cNvPicPr>
+          <p:nvPr/>
+        </p:nvPicPr>
+        <p:blipFill>
+          <a:blip r:embed="rId3"/>
+          <a:stretch>
+            <a:fillRect/>
+          </a:stretch>
+        </p:blipFill>
+        <p:spPr>
+          <a:xfrm>
+            <a:off x="1588119" y="1507215"/>
+            <a:ext cx="9015762" cy="3240541"/>
+          </a:xfrm>
+          <a:prstGeom prst="rect">
+            <a:avLst/>
+          </a:prstGeom>
+        </p:spPr>
+      </p:pic>
+      <p:sp>
+        <p:nvSpPr>
+          <p:cNvPr id="5" name="Slide Number Placeholder 4">
+            <a:extLst>
+              <a:ext uri="{FF2B5EF4-FFF2-40B4-BE49-F238E27FC236}">
+                <a16:creationId xmlns:a16="http://schemas.microsoft.com/office/drawing/2014/main" id="{1237D925-4452-4687-D8E7-E8A1770E86BF}"/>
+              </a:ext>
+            </a:extLst>
+          </p:cNvPr>
+          <p:cNvSpPr>
+            <a:spLocks noGrp="1"/>
+          </p:cNvSpPr>
+          <p:nvPr>
+            <p:ph type="sldNum" sz="quarter" idx="12"/>
           </p:nvPr>
         </p:nvSpPr>
         <p:spPr/>
@@ -3838,14 +6773,78 @@
           <a:bodyPr/>
           <a:lstStyle/>
           <a:p>
+            <a:fld id="{029AB40E-1F3D-A54A-8158-3F2FE1271995}" type="slidenum">
+              <a:rPr lang="en-US" smtClean="0"/>
+              <a:t>5</a:t>
+            </a:fld>
             <a:endParaRPr lang="en-US"/>
+          </a:p>
+        </p:txBody>
+      </p:sp>
+      <p:sp>
+        <p:nvSpPr>
+          <p:cNvPr id="6" name="TextBox 5">
+            <a:extLst>
+              <a:ext uri="{FF2B5EF4-FFF2-40B4-BE49-F238E27FC236}">
+                <a16:creationId xmlns:a16="http://schemas.microsoft.com/office/drawing/2014/main" id="{793E2D9B-2088-B58D-6639-D332B81D75F8}"/>
+              </a:ext>
+            </a:extLst>
+          </p:cNvPr>
+          <p:cNvSpPr txBox="1"/>
+          <p:nvPr/>
+        </p:nvSpPr>
+        <p:spPr>
+          <a:xfrm>
+            <a:off x="1866900" y="5042118"/>
+            <a:ext cx="8458200" cy="1384995"/>
+          </a:xfrm>
+          <a:prstGeom prst="rect">
+            <a:avLst/>
+          </a:prstGeom>
+          <a:noFill/>
+        </p:spPr>
+        <p:txBody>
+          <a:bodyPr wrap="square" rtlCol="0">
+            <a:spAutoFit/>
+          </a:bodyPr>
+          <a:lstStyle/>
+          <a:p>
+            <a:pPr marL="457200" indent="-457200">
+              <a:buFont typeface="Arial" panose="020B0604020202020204" pitchFamily="34" charset="0"/>
+              <a:buChar char="•"/>
+            </a:pPr>
+            <a:r>
+              <a:rPr lang="en-US" sz="2800" dirty="0"/>
+              <a:t>Multi-core design</a:t>
+            </a:r>
+          </a:p>
+          <a:p>
+            <a:pPr marL="457200" indent="-457200">
+              <a:buFont typeface="Arial" panose="020B0604020202020204" pitchFamily="34" charset="0"/>
+              <a:buChar char="•"/>
+            </a:pPr>
+            <a:r>
+              <a:rPr lang="en-US" sz="2800" dirty="0"/>
+              <a:t>Hardware-accelerated </a:t>
+            </a:r>
+            <a:r>
+              <a:rPr lang="en-US" sz="2800" u="sng" dirty="0"/>
+              <a:t>encryption</a:t>
+            </a:r>
+          </a:p>
+          <a:p>
+            <a:pPr marL="457200" indent="-457200">
+              <a:buFont typeface="Arial" panose="020B0604020202020204" pitchFamily="34" charset="0"/>
+              <a:buChar char="•"/>
+            </a:pPr>
+            <a:endParaRPr lang="en-US" sz="2800" dirty="0"/>
           </a:p>
         </p:txBody>
       </p:sp>
     </p:spTree>
     <p:extLst>
       <p:ext uri="{BB962C8B-B14F-4D97-AF65-F5344CB8AC3E}">
-        <p14:creationId xmlns:p14="http://schemas.microsoft.com/office/powerpoint/2010/main" val="17079913"/>
+        <p14:creationId xmlns:p14="http://schemas.microsoft.com/office/powerpoint/2010/main" val="1020415018"/>
       </p:ext>
     </p:extLst>
   </p:cSld>
@@ -3877,7 +6876,7 @@
           <p:cNvPr id="2" name="Title 1">
             <a:extLst>
               <a:ext uri="{FF2B5EF4-FFF2-40B4-BE49-F238E27FC236}">
-                <a16:creationId xmlns:a16="http://schemas.microsoft.com/office/drawing/2014/main" id="{1B7A2D0F-EF55-D631-E448-7C5847EB69E5}"/>
+                <a16:creationId xmlns:a16="http://schemas.microsoft.com/office/drawing/2014/main" id="{BC63754D-6149-EC28-E252-ACE537951263}"/>
               </a:ext>
             </a:extLst>
           </p:cNvPr>
@@ -3895,7 +6894,7 @@
           <a:p>
             <a:r>
               <a:rPr lang="en-US" dirty="0"/>
-              <a:t>Project Plan</a:t>
+              <a:t>FPGA Development Overview</a:t>
             </a:r>
           </a:p>
         </p:txBody>
@@ -3905,7 +6904,7 @@
           <p:cNvPr id="3" name="Content Placeholder 2">
             <a:extLst>
               <a:ext uri="{FF2B5EF4-FFF2-40B4-BE49-F238E27FC236}">
-                <a16:creationId xmlns:a16="http://schemas.microsoft.com/office/drawing/2014/main" id="{BF22A5D4-32E9-476D-DDDE-A83C23AAB564}"/>
+                <a16:creationId xmlns:a16="http://schemas.microsoft.com/office/drawing/2014/main" id="{DB4BF732-A795-54F4-935F-04E24108878E}"/>
               </a:ext>
             </a:extLst>
           </p:cNvPr>
@@ -3916,19 +6915,154 @@
             <p:ph idx="1"/>
           </p:nvPr>
         </p:nvSpPr>
+        <p:spPr>
+          <a:xfrm>
+            <a:off x="638002" y="1446415"/>
+            <a:ext cx="10915996" cy="5046460"/>
+          </a:xfrm>
+        </p:spPr>
+        <p:txBody>
+          <a:bodyPr>
+            <a:normAutofit fontScale="92500" lnSpcReduction="10000"/>
+          </a:bodyPr>
+          <a:lstStyle/>
+          <a:p>
+            <a:pPr marL="0" indent="0">
+              <a:buNone/>
+            </a:pPr>
+            <a:r>
+              <a:rPr lang="en-US" dirty="0"/>
+              <a:t>The chosen CPU architecture is </a:t>
+            </a:r>
+            <a:r>
+              <a:rPr lang="en-US" u="sng" dirty="0" err="1"/>
+              <a:t>VexRiscv</a:t>
+            </a:r>
+            <a:r>
+              <a:rPr lang="en-US" dirty="0"/>
+              <a:t> 32-bit</a:t>
+            </a:r>
+          </a:p>
+          <a:p>
+            <a:r>
+              <a:rPr lang="en-US" dirty="0"/>
+              <a:t>Highly-documented</a:t>
+            </a:r>
+          </a:p>
+          <a:p>
+            <a:r>
+              <a:rPr lang="en-US" dirty="0"/>
+              <a:t>Open-source</a:t>
+            </a:r>
+          </a:p>
+          <a:p>
+            <a:r>
+              <a:rPr lang="en-US" dirty="0"/>
+              <a:t>Compatible with Zephyr</a:t>
+            </a:r>
+          </a:p>
+          <a:p>
+            <a:endParaRPr lang="en-US" dirty="0"/>
+          </a:p>
+          <a:p>
+            <a:pPr marL="0" indent="0">
+              <a:buNone/>
+            </a:pPr>
+            <a:r>
+              <a:rPr lang="en-US" dirty="0"/>
+              <a:t>Developer Environment: </a:t>
+            </a:r>
+            <a:r>
+              <a:rPr lang="en-US" dirty="0" err="1"/>
+              <a:t>SpinalHDL</a:t>
+            </a:r>
+            <a:r>
+              <a:rPr lang="en-US" dirty="0"/>
+              <a:t>, Scala Build Tool, </a:t>
+            </a:r>
+            <a:r>
+              <a:rPr lang="en-US" dirty="0" err="1"/>
+              <a:t>LiteX</a:t>
+            </a:r>
+            <a:endParaRPr lang="en-US" dirty="0"/>
+          </a:p>
+          <a:p>
+            <a:pPr marL="0" indent="0">
+              <a:buNone/>
+            </a:pPr>
+            <a:endParaRPr lang="en-US" dirty="0"/>
+          </a:p>
+          <a:p>
+            <a:pPr marL="0" indent="0">
+              <a:buNone/>
+            </a:pPr>
+            <a:r>
+              <a:rPr lang="en-US" dirty="0"/>
+              <a:t>Board: Diligent Arty S7</a:t>
+            </a:r>
+          </a:p>
+          <a:p>
+            <a:r>
+              <a:rPr lang="en-AU" dirty="0"/>
+              <a:t>Xilinx Spartan-7 FPGA (XC7S50)</a:t>
+            </a:r>
+          </a:p>
+          <a:p>
+            <a:r>
+              <a:rPr lang="en-AU" dirty="0"/>
+              <a:t>8,150 logic slices, 337.5 KB </a:t>
+            </a:r>
+            <a:r>
+              <a:rPr lang="en-AU" dirty="0" err="1"/>
+              <a:t>Kb</a:t>
+            </a:r>
+            <a:r>
+              <a:rPr lang="en-AU" dirty="0"/>
+              <a:t> DRAM, 32,600 LUTs, 65,200 FFs</a:t>
+            </a:r>
+          </a:p>
+          <a:p>
+            <a:r>
+              <a:rPr lang="en-AU" dirty="0"/>
+              <a:t>Universal clock rate of 100MHz</a:t>
+            </a:r>
+            <a:endParaRPr lang="en-US" dirty="0"/>
+          </a:p>
+        </p:txBody>
+      </p:sp>
+      <p:sp>
+        <p:nvSpPr>
+          <p:cNvPr id="4" name="Slide Number Placeholder 3">
+            <a:extLst>
+              <a:ext uri="{FF2B5EF4-FFF2-40B4-BE49-F238E27FC236}">
+                <a16:creationId xmlns:a16="http://schemas.microsoft.com/office/drawing/2014/main" id="{26F64DB2-05FD-DB46-37F7-E0674EF6F5DC}"/>
+              </a:ext>
+            </a:extLst>
+          </p:cNvPr>
+          <p:cNvSpPr>
+            <a:spLocks noGrp="1"/>
+          </p:cNvSpPr>
+          <p:nvPr>
+            <p:ph type="sldNum" sz="quarter" idx="12"/>
+          </p:nvPr>
+        </p:nvSpPr>
         <p:spPr/>
         <p:txBody>
           <a:bodyPr/>
           <a:lstStyle/>
           <a:p>
-            <a:endParaRPr lang="en-US" dirty="0"/>
+            <a:fld id="{029AB40E-1F3D-A54A-8158-3F2FE1271995}" type="slidenum">
+              <a:rPr lang="en-US" smtClean="0"/>
+              <a:t>6</a:t>
+            </a:fld>
+            <a:endParaRPr lang="en-US"/>
           </a:p>
         </p:txBody>
       </p:sp>
     </p:spTree>
     <p:extLst>
       <p:ext uri="{BB962C8B-B14F-4D97-AF65-F5344CB8AC3E}">
-        <p14:creationId xmlns:p14="http://schemas.microsoft.com/office/powerpoint/2010/main" val="3026550673"/>
+        <p14:creationId xmlns:p14="http://schemas.microsoft.com/office/powerpoint/2010/main" val="1755887671"/>
       </p:ext>
     </p:extLst>
   </p:cSld>
@@ -3960,7 +7094,7 @@
           <p:cNvPr id="2" name="Title 1">
             <a:extLst>
               <a:ext uri="{FF2B5EF4-FFF2-40B4-BE49-F238E27FC236}">
-                <a16:creationId xmlns:a16="http://schemas.microsoft.com/office/drawing/2014/main" id="{98729172-470B-DBC4-7A58-708E8D10D63A}"/>
+                <a16:creationId xmlns:a16="http://schemas.microsoft.com/office/drawing/2014/main" id="{2306D6F6-34A4-E412-5632-5E76C6602D41}"/>
               </a:ext>
             </a:extLst>
           </p:cNvPr>
@@ -3978,7 +7112,7 @@
           <a:p>
             <a:r>
               <a:rPr lang="en-US" dirty="0"/>
-              <a:t>Progress so Far…</a:t>
+              <a:t>AES Engine</a:t>
             </a:r>
           </a:p>
         </p:txBody>
@@ -3988,7 +7122,7 @@
           <p:cNvPr id="3" name="Content Placeholder 2">
             <a:extLst>
               <a:ext uri="{FF2B5EF4-FFF2-40B4-BE49-F238E27FC236}">
-                <a16:creationId xmlns:a16="http://schemas.microsoft.com/office/drawing/2014/main" id="{50FDEF6C-F9C1-92AE-0B63-FD628BEE472C}"/>
+                <a16:creationId xmlns:a16="http://schemas.microsoft.com/office/drawing/2014/main" id="{7C17DD92-BA65-6B02-7886-B5921E79D296}"/>
               </a:ext>
             </a:extLst>
           </p:cNvPr>
@@ -3999,19 +7133,223 @@
             <p:ph idx="1"/>
           </p:nvPr>
         </p:nvSpPr>
+        <p:spPr>
+          <a:xfrm>
+            <a:off x="838200" y="1689894"/>
+            <a:ext cx="10515600" cy="1603375"/>
+          </a:xfrm>
+        </p:spPr>
+        <p:txBody>
+          <a:bodyPr/>
+          <a:lstStyle/>
+          <a:p>
+            <a:r>
+              <a:rPr lang="en-US" dirty="0"/>
+              <a:t>Chosen encryption method: 128-aes-cbc</a:t>
+            </a:r>
+          </a:p>
+          <a:p>
+            <a:r>
+              <a:rPr lang="en-US" b="1" dirty="0"/>
+              <a:t>A</a:t>
+            </a:r>
+            <a:r>
+              <a:rPr lang="en-US" dirty="0"/>
+              <a:t>dvanced </a:t>
+            </a:r>
+            <a:r>
+              <a:rPr lang="en-US" b="1" dirty="0"/>
+              <a:t>E</a:t>
+            </a:r>
+            <a:r>
+              <a:rPr lang="en-US" dirty="0"/>
+              <a:t>ncryption </a:t>
+            </a:r>
+            <a:r>
+              <a:rPr lang="en-US" b="1" dirty="0"/>
+              <a:t>S</a:t>
+            </a:r>
+            <a:r>
+              <a:rPr lang="en-US" dirty="0"/>
+              <a:t>tandard, 128-bit block and key length, </a:t>
+            </a:r>
+            <a:r>
+              <a:rPr lang="en-US" b="1" dirty="0"/>
+              <a:t>C</a:t>
+            </a:r>
+            <a:r>
+              <a:rPr lang="en-US" dirty="0"/>
+              <a:t>ipher </a:t>
+            </a:r>
+            <a:r>
+              <a:rPr lang="en-US" b="1" dirty="0"/>
+              <a:t>B</a:t>
+            </a:r>
+            <a:r>
+              <a:rPr lang="en-US" dirty="0"/>
+              <a:t>lock </a:t>
+            </a:r>
+            <a:r>
+              <a:rPr lang="en-US" b="1" dirty="0"/>
+              <a:t>C</a:t>
+            </a:r>
+            <a:r>
+              <a:rPr lang="en-US" dirty="0"/>
+              <a:t>haining</a:t>
+            </a:r>
+          </a:p>
+        </p:txBody>
+      </p:sp>
+      <p:sp>
+        <p:nvSpPr>
+          <p:cNvPr id="4" name="Slide Number Placeholder 3">
+            <a:extLst>
+              <a:ext uri="{FF2B5EF4-FFF2-40B4-BE49-F238E27FC236}">
+                <a16:creationId xmlns:a16="http://schemas.microsoft.com/office/drawing/2014/main" id="{794F8250-D27A-6F70-031B-46A53A7ADAD5}"/>
+              </a:ext>
+            </a:extLst>
+          </p:cNvPr>
+          <p:cNvSpPr>
+            <a:spLocks noGrp="1"/>
+          </p:cNvSpPr>
+          <p:nvPr>
+            <p:ph type="sldNum" sz="quarter" idx="12"/>
+          </p:nvPr>
+        </p:nvSpPr>
         <p:spPr/>
         <p:txBody>
           <a:bodyPr/>
           <a:lstStyle/>
           <a:p>
+            <a:fld id="{029AB40E-1F3D-A54A-8158-3F2FE1271995}" type="slidenum">
+              <a:rPr lang="en-US" smtClean="0"/>
+              <a:t>7</a:t>
+            </a:fld>
             <a:endParaRPr lang="en-US"/>
+          </a:p>
+        </p:txBody>
+      </p:sp>
+      <p:sp>
+        <p:nvSpPr>
+          <p:cNvPr id="5" name="TextBox 4">
+            <a:extLst>
+              <a:ext uri="{FF2B5EF4-FFF2-40B4-BE49-F238E27FC236}">
+                <a16:creationId xmlns:a16="http://schemas.microsoft.com/office/drawing/2014/main" id="{2D63C6C6-65F4-04BA-D4F9-F8F1AFCF5301}"/>
+              </a:ext>
+            </a:extLst>
+          </p:cNvPr>
+          <p:cNvSpPr txBox="1"/>
+          <p:nvPr/>
+        </p:nvSpPr>
+        <p:spPr>
+          <a:xfrm>
+            <a:off x="2063357" y="5968044"/>
+            <a:ext cx="8065285" cy="523220"/>
+          </a:xfrm>
+          <a:prstGeom prst="rect">
+            <a:avLst/>
+          </a:prstGeom>
+          <a:noFill/>
+        </p:spPr>
+        <p:txBody>
+          <a:bodyPr wrap="none" rtlCol="0">
+            <a:spAutoFit/>
+          </a:bodyPr>
+          <a:lstStyle/>
+          <a:p>
+            <a:r>
+              <a:rPr lang="en-US" sz="2800" dirty="0"/>
+              <a:t>Unfortunately, only does encryption in serial blocks</a:t>
+            </a:r>
+          </a:p>
+        </p:txBody>
+      </p:sp>
+      <p:pic>
+        <p:nvPicPr>
+          <p:cNvPr id="7" name="Picture 6">
+            <a:extLst>
+              <a:ext uri="{FF2B5EF4-FFF2-40B4-BE49-F238E27FC236}">
+                <a16:creationId xmlns:a16="http://schemas.microsoft.com/office/drawing/2014/main" id="{A1665B85-0CD8-8B31-7EE5-557698E49A50}"/>
+              </a:ext>
+            </a:extLst>
+          </p:cNvPr>
+          <p:cNvPicPr>
+            <a:picLocks noChangeAspect="1"/>
+          </p:cNvPicPr>
+          <p:nvPr/>
+        </p:nvPicPr>
+        <p:blipFill>
+          <a:blip r:embed="rId2"/>
+          <a:stretch>
+            <a:fillRect/>
+          </a:stretch>
+        </p:blipFill>
+        <p:spPr>
+          <a:xfrm>
+            <a:off x="1194539" y="3147074"/>
+            <a:ext cx="7225561" cy="2681976"/>
+          </a:xfrm>
+          <a:prstGeom prst="rect">
+            <a:avLst/>
+          </a:prstGeom>
+        </p:spPr>
+      </p:pic>
+      <p:sp>
+        <p:nvSpPr>
+          <p:cNvPr id="8" name="TextBox 7">
+            <a:extLst>
+              <a:ext uri="{FF2B5EF4-FFF2-40B4-BE49-F238E27FC236}">
+                <a16:creationId xmlns:a16="http://schemas.microsoft.com/office/drawing/2014/main" id="{A48BEC5D-A75B-1654-4BDA-9FFA6BD2C26F}"/>
+              </a:ext>
+            </a:extLst>
+          </p:cNvPr>
+          <p:cNvSpPr txBox="1"/>
+          <p:nvPr/>
+        </p:nvSpPr>
+        <p:spPr>
+          <a:xfrm>
+            <a:off x="8643437" y="3564732"/>
+            <a:ext cx="2743200" cy="923330"/>
+          </a:xfrm>
+          <a:prstGeom prst="rect">
+            <a:avLst/>
+          </a:prstGeom>
+          <a:noFill/>
+        </p:spPr>
+        <p:txBody>
+          <a:bodyPr wrap="square" rtlCol="0">
+            <a:spAutoFit/>
+          </a:bodyPr>
+          <a:lstStyle/>
+          <a:p>
+            <a:r>
+              <a:rPr lang="en-US" dirty="0"/>
+              <a:t>From </a:t>
+            </a:r>
+            <a:r>
+              <a:rPr lang="en-US" i="1" dirty="0"/>
+              <a:t>https://</a:t>
+            </a:r>
+            <a:r>
+              <a:rPr lang="en-US" i="1" dirty="0" err="1"/>
+              <a:t>www.cast-inc.com</a:t>
+            </a:r>
+            <a:r>
+              <a:rPr lang="en-US" i="1" dirty="0"/>
+              <a:t>/security/encryption-primitives/</a:t>
+            </a:r>
+            <a:r>
+              <a:rPr lang="en-US" i="1" dirty="0" err="1"/>
+              <a:t>aes</a:t>
+            </a:r>
+            <a:endParaRPr lang="en-US" i="1" dirty="0"/>
           </a:p>
         </p:txBody>
       </p:sp>
     </p:spTree>
     <p:extLst>
       <p:ext uri="{BB962C8B-B14F-4D97-AF65-F5344CB8AC3E}">
-        <p14:creationId xmlns:p14="http://schemas.microsoft.com/office/powerpoint/2010/main" val="576480125"/>
+        <p14:creationId xmlns:p14="http://schemas.microsoft.com/office/powerpoint/2010/main" val="633393757"/>
       </p:ext>
     </p:extLst>
   </p:cSld>
@@ -4043,7 +7381,7 @@
           <p:cNvPr id="2" name="Title 1">
             <a:extLst>
               <a:ext uri="{FF2B5EF4-FFF2-40B4-BE49-F238E27FC236}">
-                <a16:creationId xmlns:a16="http://schemas.microsoft.com/office/drawing/2014/main" id="{A0A5434A-F66B-D8DC-2E46-43413109BB9E}"/>
+                <a16:creationId xmlns:a16="http://schemas.microsoft.com/office/drawing/2014/main" id="{1C569A81-52B9-E136-9BC1-185674D72016}"/>
               </a:ext>
             </a:extLst>
           </p:cNvPr>
@@ -4061,25 +7399,55 @@
           <a:p>
             <a:r>
               <a:rPr lang="en-US" dirty="0"/>
-              <a:t>Q&amp;A</a:t>
-            </a:r>
-          </a:p>
-        </p:txBody>
-      </p:sp>
-      <p:sp>
-        <p:nvSpPr>
-          <p:cNvPr id="3" name="Content Placeholder 2">
-            <a:extLst>
-              <a:ext uri="{FF2B5EF4-FFF2-40B4-BE49-F238E27FC236}">
-                <a16:creationId xmlns:a16="http://schemas.microsoft.com/office/drawing/2014/main" id="{FAB655F2-E989-27F6-BD2A-C86268591CC1}"/>
-              </a:ext>
-            </a:extLst>
-          </p:cNvPr>
-          <p:cNvSpPr>
-            <a:spLocks noGrp="1"/>
-          </p:cNvSpPr>
-          <p:nvPr>
-            <p:ph idx="1"/>
+              <a:t>Testbed Overview</a:t>
+            </a:r>
+          </a:p>
+        </p:txBody>
+      </p:sp>
+      <p:pic>
+        <p:nvPicPr>
+          <p:cNvPr id="7" name="Picture 6" descr="A diagram of a router&#10;&#10;Description automatically generated">
+            <a:extLst>
+              <a:ext uri="{FF2B5EF4-FFF2-40B4-BE49-F238E27FC236}">
+                <a16:creationId xmlns:a16="http://schemas.microsoft.com/office/drawing/2014/main" id="{C0BB1F9C-1D39-1111-5B23-F98C0FDB0690}"/>
+              </a:ext>
+            </a:extLst>
+          </p:cNvPr>
+          <p:cNvPicPr>
+            <a:picLocks noChangeAspect="1"/>
+          </p:cNvPicPr>
+          <p:nvPr/>
+        </p:nvPicPr>
+        <p:blipFill>
+          <a:blip r:embed="rId2"/>
+          <a:stretch>
+            <a:fillRect/>
+          </a:stretch>
+        </p:blipFill>
+        <p:spPr>
+          <a:xfrm>
+            <a:off x="1437176" y="1491854"/>
+            <a:ext cx="9317647" cy="3364706"/>
+          </a:xfrm>
+          <a:prstGeom prst="rect">
+            <a:avLst/>
+          </a:prstGeom>
+        </p:spPr>
+      </p:pic>
+      <p:sp>
+        <p:nvSpPr>
+          <p:cNvPr id="10" name="Slide Number Placeholder 9">
+            <a:extLst>
+              <a:ext uri="{FF2B5EF4-FFF2-40B4-BE49-F238E27FC236}">
+                <a16:creationId xmlns:a16="http://schemas.microsoft.com/office/drawing/2014/main" id="{C78723E4-82BD-59AB-A399-ABD0CFFB5358}"/>
+              </a:ext>
+            </a:extLst>
+          </p:cNvPr>
+          <p:cNvSpPr>
+            <a:spLocks noGrp="1"/>
+          </p:cNvSpPr>
+          <p:nvPr>
+            <p:ph type="sldNum" sz="quarter" idx="12"/>
           </p:nvPr>
         </p:nvSpPr>
         <p:spPr/>
@@ -4087,14 +7455,222 @@
           <a:bodyPr/>
           <a:lstStyle/>
           <a:p>
-            <a:endParaRPr lang="en-US" dirty="0"/>
+            <a:fld id="{029AB40E-1F3D-A54A-8158-3F2FE1271995}" type="slidenum">
+              <a:rPr lang="en-US" smtClean="0"/>
+              <a:t>8</a:t>
+            </a:fld>
+            <a:endParaRPr lang="en-US"/>
+          </a:p>
+        </p:txBody>
+      </p:sp>
+      <p:sp>
+        <p:nvSpPr>
+          <p:cNvPr id="11" name="TextBox 10">
+            <a:extLst>
+              <a:ext uri="{FF2B5EF4-FFF2-40B4-BE49-F238E27FC236}">
+                <a16:creationId xmlns:a16="http://schemas.microsoft.com/office/drawing/2014/main" id="{CB301E73-7B43-6796-1A1F-9E20537F66D5}"/>
+              </a:ext>
+            </a:extLst>
+          </p:cNvPr>
+          <p:cNvSpPr txBox="1"/>
+          <p:nvPr/>
+        </p:nvSpPr>
+        <p:spPr>
+          <a:xfrm>
+            <a:off x="838200" y="5279132"/>
+            <a:ext cx="7772400" cy="1077218"/>
+          </a:xfrm>
+          <a:prstGeom prst="rect">
+            <a:avLst/>
+          </a:prstGeom>
+          <a:noFill/>
+        </p:spPr>
+        <p:txBody>
+          <a:bodyPr wrap="square" rtlCol="0">
+            <a:spAutoFit/>
+          </a:bodyPr>
+          <a:lstStyle/>
+          <a:p>
+            <a:pPr marL="342900" indent="-342900">
+              <a:buFont typeface="Arial" panose="020B0604020202020204" pitchFamily="34" charset="0"/>
+              <a:buChar char="•"/>
+            </a:pPr>
+            <a:r>
+              <a:rPr lang="en-US" sz="3200" dirty="0"/>
+              <a:t>RPI3s will be used for Cluster Devices</a:t>
+            </a:r>
+          </a:p>
+          <a:p>
+            <a:pPr marL="342900" indent="-342900">
+              <a:buFont typeface="Arial" panose="020B0604020202020204" pitchFamily="34" charset="0"/>
+              <a:buChar char="•"/>
+            </a:pPr>
+            <a:r>
+              <a:rPr lang="en-US" sz="3200" dirty="0"/>
+              <a:t>Kubernetes will orchestrate deployment</a:t>
+            </a:r>
           </a:p>
         </p:txBody>
       </p:sp>
     </p:spTree>
     <p:extLst>
       <p:ext uri="{BB962C8B-B14F-4D97-AF65-F5344CB8AC3E}">
-        <p14:creationId xmlns:p14="http://schemas.microsoft.com/office/powerpoint/2010/main" val="2997805184"/>
+        <p14:creationId xmlns:p14="http://schemas.microsoft.com/office/powerpoint/2010/main" val="1019052452"/>
+      </p:ext>
+    </p:extLst>
+  </p:cSld>
+  <p:clrMapOvr>
+    <a:masterClrMapping/>
+  </p:clrMapOvr>
+</p:sld>
+</file>
+
+<file path=ppt/slides/slide9.xml><?xml version="1.0" encoding="utf-8"?>
+<p:sld xmlns:a="http://schemas.openxmlformats.org/drawingml/2006/main" xmlns:r="http://schemas.openxmlformats.org/officeDocument/2006/relationships" xmlns:p="http://schemas.openxmlformats.org/presentationml/2006/main">
+  <p:cSld>
+    <p:spTree>
+      <p:nvGrpSpPr>
+        <p:cNvPr id="1" name=""/>
+        <p:cNvGrpSpPr/>
+        <p:nvPr/>
+      </p:nvGrpSpPr>
+      <p:grpSpPr>
+        <a:xfrm>
+          <a:off x="0" y="0"/>
+          <a:ext cx="0" cy="0"/>
+          <a:chOff x="0" y="0"/>
+          <a:chExt cx="0" cy="0"/>
+        </a:xfrm>
+      </p:grpSpPr>
+      <p:sp>
+        <p:nvSpPr>
+          <p:cNvPr id="2" name="Title 1">
+            <a:extLst>
+              <a:ext uri="{FF2B5EF4-FFF2-40B4-BE49-F238E27FC236}">
+                <a16:creationId xmlns:a16="http://schemas.microsoft.com/office/drawing/2014/main" id="{22BCB47A-DEA6-489E-4408-12D922515D86}"/>
+              </a:ext>
+            </a:extLst>
+          </p:cNvPr>
+          <p:cNvSpPr>
+            <a:spLocks noGrp="1"/>
+          </p:cNvSpPr>
+          <p:nvPr>
+            <p:ph type="title"/>
+          </p:nvPr>
+        </p:nvSpPr>
+        <p:spPr/>
+        <p:txBody>
+          <a:bodyPr/>
+          <a:lstStyle/>
+          <a:p>
+            <a:r>
+              <a:rPr lang="en-US" dirty="0"/>
+              <a:t>What is Kubernetes??</a:t>
+            </a:r>
+          </a:p>
+        </p:txBody>
+      </p:sp>
+      <p:sp>
+        <p:nvSpPr>
+          <p:cNvPr id="3" name="Content Placeholder 2">
+            <a:extLst>
+              <a:ext uri="{FF2B5EF4-FFF2-40B4-BE49-F238E27FC236}">
+                <a16:creationId xmlns:a16="http://schemas.microsoft.com/office/drawing/2014/main" id="{89583DD6-18EF-57B3-9EF2-302AA72279B3}"/>
+              </a:ext>
+            </a:extLst>
+          </p:cNvPr>
+          <p:cNvSpPr>
+            <a:spLocks noGrp="1"/>
+          </p:cNvSpPr>
+          <p:nvPr>
+            <p:ph idx="1"/>
+          </p:nvPr>
+        </p:nvSpPr>
+        <p:spPr/>
+        <p:txBody>
+          <a:bodyPr/>
+          <a:lstStyle/>
+          <a:p>
+            <a:r>
+              <a:rPr lang="en-US" dirty="0"/>
+              <a:t>Docker is a program that builds and runs containers</a:t>
+            </a:r>
+          </a:p>
+          <a:p>
+            <a:r>
+              <a:rPr lang="en-US" dirty="0"/>
+              <a:t>Containers are pre-packaged software applications (images)</a:t>
+            </a:r>
+          </a:p>
+          <a:p>
+            <a:r>
+              <a:rPr lang="en-US" dirty="0"/>
+              <a:t>Kubernetes </a:t>
+            </a:r>
+            <a:r>
+              <a:rPr lang="en-US" u="sng" dirty="0"/>
+              <a:t>orchestrates</a:t>
+            </a:r>
+            <a:r>
+              <a:rPr lang="en-US" dirty="0"/>
+              <a:t> the running of containers</a:t>
+            </a:r>
+          </a:p>
+          <a:p>
+            <a:pPr lvl="1"/>
+            <a:r>
+              <a:rPr lang="en-US" dirty="0"/>
+              <a:t>Handles deployment, scaling etc.</a:t>
+            </a:r>
+          </a:p>
+          <a:p>
+            <a:r>
+              <a:rPr lang="en-US" dirty="0"/>
+              <a:t>A ‘Node’ in Kubernetes is like an edge in a network</a:t>
+            </a:r>
+          </a:p>
+          <a:p>
+            <a:pPr lvl="1"/>
+            <a:r>
+              <a:rPr lang="en-US" dirty="0"/>
+              <a:t>It can be a collection of containers or a control panel node</a:t>
+            </a:r>
+          </a:p>
+        </p:txBody>
+      </p:sp>
+      <p:sp>
+        <p:nvSpPr>
+          <p:cNvPr id="4" name="Slide Number Placeholder 3">
+            <a:extLst>
+              <a:ext uri="{FF2B5EF4-FFF2-40B4-BE49-F238E27FC236}">
+                <a16:creationId xmlns:a16="http://schemas.microsoft.com/office/drawing/2014/main" id="{3A612806-1582-4F6E-C168-40F933569B9A}"/>
+              </a:ext>
+            </a:extLst>
+          </p:cNvPr>
+          <p:cNvSpPr>
+            <a:spLocks noGrp="1"/>
+          </p:cNvSpPr>
+          <p:nvPr>
+            <p:ph type="sldNum" sz="quarter" idx="12"/>
+          </p:nvPr>
+        </p:nvSpPr>
+        <p:spPr/>
+        <p:txBody>
+          <a:bodyPr/>
+          <a:lstStyle/>
+          <a:p>
+            <a:fld id="{029AB40E-1F3D-A54A-8158-3F2FE1271995}" type="slidenum">
+              <a:rPr lang="en-US" smtClean="0"/>
+              <a:t>9</a:t>
+            </a:fld>
+            <a:endParaRPr lang="en-US"/>
+          </a:p>
+        </p:txBody>
+      </p:sp>
+    </p:spTree>
+    <p:extLst>
+      <p:ext uri="{BB962C8B-B14F-4D97-AF65-F5344CB8AC3E}">
+        <p14:creationId xmlns:p14="http://schemas.microsoft.com/office/powerpoint/2010/main" val="3523353225"/>
       </p:ext>
     </p:extLst>
   </p:cSld>
@@ -4417,4 +7993,319 @@
     </a:ext>
   </a:extLst>
 </a:theme>
+</file>
+
+<file path=ppt/theme/theme2.xml><?xml version="1.0" encoding="utf-8"?>
+<a:theme xmlns:a="http://schemas.openxmlformats.org/drawingml/2006/main" name="Office Theme">
+  <a:themeElements>
+    <a:clrScheme name="Office">
+      <a:dk1>
+        <a:sysClr val="windowText" lastClr="000000"/>
+      </a:dk1>
+      <a:lt1>
+        <a:sysClr val="window" lastClr="FFFFFF"/>
+      </a:lt1>
+      <a:dk2>
+        <a:srgbClr val="0E2841"/>
+      </a:dk2>
+      <a:lt2>
+        <a:srgbClr val="E8E8E8"/>
+      </a:lt2>
+      <a:accent1>
+        <a:srgbClr val="156082"/>
+      </a:accent1>
+      <a:accent2>
+        <a:srgbClr val="E97132"/>
+      </a:accent2>
+      <a:accent3>
+        <a:srgbClr val="196B24"/>
+      </a:accent3>
+      <a:accent4>
+        <a:srgbClr val="0F9ED5"/>
+      </a:accent4>
+      <a:accent5>
+        <a:srgbClr val="A02B93"/>
+      </a:accent5>
+      <a:accent6>
+        <a:srgbClr val="4EA72E"/>
+      </a:accent6>
+      <a:hlink>
+        <a:srgbClr val="467886"/>
+      </a:hlink>
+      <a:folHlink>
+        <a:srgbClr val="96607D"/>
+      </a:folHlink>
+    </a:clrScheme>
+    <a:fontScheme name="Office">
+      <a:majorFont>
+        <a:latin typeface="Aptos Display" panose="02110004020202020204"/>
+        <a:ea typeface=""/>
+        <a:cs typeface=""/>
+        <a:font script="Jpan" typeface="游ゴシック Light"/>
+        <a:font script="Hang" typeface="맑은 고딕"/>
+        <a:font script="Hans" typeface="等线 Light"/>
+        <a:font script="Hant" typeface="新細明體"/>
+        <a:font script="Arab" typeface="Times New Roman"/>
+        <a:font script="Hebr" typeface="Times New Roman"/>
+        <a:font script="Thai" typeface="Angsana New"/>
+        <a:font script="Ethi" typeface="Nyala"/>
+        <a:font script="Beng" typeface="Vrinda"/>
+        <a:font script="Gujr" typeface="Shruti"/>
+        <a:font script="Khmr" typeface="MoolBoran"/>
+        <a:font script="Knda" typeface="Tunga"/>
+        <a:font script="Guru" typeface="Raavi"/>
+        <a:font script="Cans" typeface="Euphemia"/>
+        <a:font script="Cher" typeface="Plantagenet Cherokee"/>
+        <a:font script="Yiii" typeface="Microsoft Yi Baiti"/>
+        <a:font script="Tibt" typeface="Microsoft Himalaya"/>
+        <a:font script="Thaa" typeface="MV Boli"/>
+        <a:font script="Deva" typeface="Mangal"/>
+        <a:font script="Telu" typeface="Gautami"/>
+        <a:font script="Taml" typeface="Latha"/>
+        <a:font script="Syrc" typeface="Estrangelo Edessa"/>
+        <a:font script="Orya" typeface="Kalinga"/>
+        <a:font script="Mlym" typeface="Kartika"/>
+        <a:font script="Laoo" typeface="DokChampa"/>
+        <a:font script="Sinh" typeface="Iskoola Pota"/>
+        <a:font script="Mong" typeface="Mongolian Baiti"/>
+        <a:font script="Viet" typeface="Times New Roman"/>
+        <a:font script="Uigh" typeface="Microsoft Uighur"/>
+        <a:font script="Geor" typeface="Sylfaen"/>
+        <a:font script="Armn" typeface="Arial"/>
+        <a:font script="Bugi" typeface="Leelawadee UI"/>
+        <a:font script="Bopo" typeface="Microsoft JhengHei"/>
+        <a:font script="Java" typeface="Javanese Text"/>
+        <a:font script="Lisu" typeface="Segoe UI"/>
+        <a:font script="Mymr" typeface="Myanmar Text"/>
+        <a:font script="Nkoo" typeface="Ebrima"/>
+        <a:font script="Olck" typeface="Nirmala UI"/>
+        <a:font script="Osma" typeface="Ebrima"/>
+        <a:font script="Phag" typeface="Phagspa"/>
+        <a:font script="Syrn" typeface="Estrangelo Edessa"/>
+        <a:font script="Syrj" typeface="Estrangelo Edessa"/>
+        <a:font script="Syre" typeface="Estrangelo Edessa"/>
+        <a:font script="Sora" typeface="Nirmala UI"/>
+        <a:font script="Tale" typeface="Microsoft Tai Le"/>
+        <a:font script="Talu" typeface="Microsoft New Tai Lue"/>
+        <a:font script="Tfng" typeface="Ebrima"/>
+      </a:majorFont>
+      <a:minorFont>
+        <a:latin typeface="Aptos" panose="02110004020202020204"/>
+        <a:ea typeface=""/>
+        <a:cs typeface=""/>
+        <a:font script="Jpan" typeface="游ゴシック"/>
+        <a:font script="Hang" typeface="맑은 고딕"/>
+        <a:font script="Hans" typeface="等线"/>
+        <a:font script="Hant" typeface="新細明體"/>
+        <a:font script="Arab" typeface="Arial"/>
+        <a:font script="Hebr" typeface="Arial"/>
+        <a:font script="Thai" typeface="Cordia New"/>
+        <a:font script="Ethi" typeface="Nyala"/>
+        <a:font script="Beng" typeface="Vrinda"/>
+        <a:font script="Gujr" typeface="Shruti"/>
+        <a:font script="Khmr" typeface="DaunPenh"/>
+        <a:font script="Knda" typeface="Tunga"/>
+        <a:font script="Guru" typeface="Raavi"/>
+        <a:font script="Cans" typeface="Euphemia"/>
+        <a:font script="Cher" typeface="Plantagenet Cherokee"/>
+        <a:font script="Yiii" typeface="Microsoft Yi Baiti"/>
+        <a:font script="Tibt" typeface="Microsoft Himalaya"/>
+        <a:font script="Thaa" typeface="MV Boli"/>
+        <a:font script="Deva" typeface="Mangal"/>
+        <a:font script="Telu" typeface="Gautami"/>
+        <a:font script="Taml" typeface="Latha"/>
+        <a:font script="Syrc" typeface="Estrangelo Edessa"/>
+        <a:font script="Orya" typeface="Kalinga"/>
+        <a:font script="Mlym" typeface="Kartika"/>
+        <a:font script="Laoo" typeface="DokChampa"/>
+        <a:font script="Sinh" typeface="Iskoola Pota"/>
+        <a:font script="Mong" typeface="Mongolian Baiti"/>
+        <a:font script="Viet" typeface="Arial"/>
+        <a:font script="Uigh" typeface="Microsoft Uighur"/>
+        <a:font script="Geor" typeface="Sylfaen"/>
+        <a:font script="Armn" typeface="Arial"/>
+        <a:font script="Bugi" typeface="Leelawadee UI"/>
+        <a:font script="Bopo" typeface="Microsoft JhengHei"/>
+        <a:font script="Java" typeface="Javanese Text"/>
+        <a:font script="Lisu" typeface="Segoe UI"/>
+        <a:font script="Mymr" typeface="Myanmar Text"/>
+        <a:font script="Nkoo" typeface="Ebrima"/>
+        <a:font script="Olck" typeface="Nirmala UI"/>
+        <a:font script="Osma" typeface="Ebrima"/>
+        <a:font script="Phag" typeface="Phagspa"/>
+        <a:font script="Syrn" typeface="Estrangelo Edessa"/>
+        <a:font script="Syrj" typeface="Estrangelo Edessa"/>
+        <a:font script="Syre" typeface="Estrangelo Edessa"/>
+        <a:font script="Sora" typeface="Nirmala UI"/>
+        <a:font script="Tale" typeface="Microsoft Tai Le"/>
+        <a:font script="Talu" typeface="Microsoft New Tai Lue"/>
+        <a:font script="Tfng" typeface="Ebrima"/>
+      </a:minorFont>
+    </a:fontScheme>
+    <a:fmtScheme name="Office">
+      <a:fillStyleLst>
+        <a:solidFill>
+          <a:schemeClr val="phClr"/>
+        </a:solidFill>
+        <a:gradFill rotWithShape="1">
+          <a:gsLst>
+            <a:gs pos="0">
+              <a:schemeClr val="phClr">
+                <a:lumMod val="110000"/>
+                <a:satMod val="105000"/>
+                <a:tint val="67000"/>
+              </a:schemeClr>
+            </a:gs>
+            <a:gs pos="50000">
+              <a:schemeClr val="phClr">
+                <a:lumMod val="105000"/>
+                <a:satMod val="103000"/>
+                <a:tint val="73000"/>
+              </a:schemeClr>
+            </a:gs>
+            <a:gs pos="100000">
+              <a:schemeClr val="phClr">
+                <a:lumMod val="105000"/>
+                <a:satMod val="109000"/>
+                <a:tint val="81000"/>
+              </a:schemeClr>
+            </a:gs>
+          </a:gsLst>
+          <a:lin ang="5400000" scaled="0"/>
+        </a:gradFill>
+        <a:gradFill rotWithShape="1">
+          <a:gsLst>
+            <a:gs pos="0">
+              <a:schemeClr val="phClr">
+                <a:satMod val="103000"/>
+                <a:lumMod val="102000"/>
+                <a:tint val="94000"/>
+              </a:schemeClr>
+            </a:gs>
+            <a:gs pos="50000">
+              <a:schemeClr val="phClr">
+                <a:satMod val="110000"/>
+                <a:lumMod val="100000"/>
+                <a:shade val="100000"/>
+              </a:schemeClr>
+            </a:gs>
+            <a:gs pos="100000">
+              <a:schemeClr val="phClr">
+                <a:lumMod val="99000"/>
+                <a:satMod val="120000"/>
+                <a:shade val="78000"/>
+              </a:schemeClr>
+            </a:gs>
+          </a:gsLst>
+          <a:lin ang="5400000" scaled="0"/>
+        </a:gradFill>
+      </a:fillStyleLst>
+      <a:lnStyleLst>
+        <a:ln w="12700" cap="flat" cmpd="sng" algn="ctr">
+          <a:solidFill>
+            <a:schemeClr val="phClr"/>
+          </a:solidFill>
+          <a:prstDash val="solid"/>
+          <a:miter lim="800000"/>
+        </a:ln>
+        <a:ln w="19050" cap="flat" cmpd="sng" algn="ctr">
+          <a:solidFill>
+            <a:schemeClr val="phClr"/>
+          </a:solidFill>
+          <a:prstDash val="solid"/>
+          <a:miter lim="800000"/>
+        </a:ln>
+        <a:ln w="25400" cap="flat" cmpd="sng" algn="ctr">
+          <a:solidFill>
+            <a:schemeClr val="phClr"/>
+          </a:solidFill>
+          <a:prstDash val="solid"/>
+          <a:miter lim="800000"/>
+        </a:ln>
+      </a:lnStyleLst>
+      <a:effectStyleLst>
+        <a:effectStyle>
+          <a:effectLst/>
+        </a:effectStyle>
+        <a:effectStyle>
+          <a:effectLst/>
+        </a:effectStyle>
+        <a:effectStyle>
+          <a:effectLst>
+            <a:outerShdw blurRad="57150" dist="19050" dir="5400000" algn="ctr" rotWithShape="0">
+              <a:srgbClr val="000000">
+                <a:alpha val="63000"/>
+              </a:srgbClr>
+            </a:outerShdw>
+          </a:effectLst>
+        </a:effectStyle>
+      </a:effectStyleLst>
+      <a:bgFillStyleLst>
+        <a:solidFill>
+          <a:schemeClr val="phClr"/>
+        </a:solidFill>
+        <a:solidFill>
+          <a:schemeClr val="phClr">
+            <a:tint val="95000"/>
+            <a:satMod val="170000"/>
+          </a:schemeClr>
+        </a:solidFill>
+        <a:gradFill rotWithShape="1">
+          <a:gsLst>
+            <a:gs pos="0">
+              <a:schemeClr val="phClr">
+                <a:tint val="93000"/>
+                <a:satMod val="150000"/>
+                <a:shade val="98000"/>
+                <a:lumMod val="102000"/>
+              </a:schemeClr>
+            </a:gs>
+            <a:gs pos="50000">
+              <a:schemeClr val="phClr">
+                <a:tint val="98000"/>
+                <a:satMod val="130000"/>
+                <a:shade val="90000"/>
+                <a:lumMod val="103000"/>
+              </a:schemeClr>
+            </a:gs>
+            <a:gs pos="100000">
+              <a:schemeClr val="phClr">
+                <a:shade val="63000"/>
+                <a:satMod val="120000"/>
+              </a:schemeClr>
+            </a:gs>
+          </a:gsLst>
+          <a:lin ang="5400000" scaled="0"/>
+        </a:gradFill>
+      </a:bgFillStyleLst>
+    </a:fmtScheme>
+  </a:themeElements>
+  <a:objectDefaults>
+    <a:lnDef>
+      <a:spPr/>
+      <a:bodyPr/>
+      <a:lstStyle/>
+      <a:style>
+        <a:lnRef idx="2">
+          <a:schemeClr val="accent1"/>
+        </a:lnRef>
+        <a:fillRef idx="0">
+          <a:schemeClr val="accent1"/>
+        </a:fillRef>
+        <a:effectRef idx="1">
+          <a:schemeClr val="accent1"/>
+        </a:effectRef>
+        <a:fontRef idx="minor">
+          <a:schemeClr val="tx1"/>
+        </a:fontRef>
+      </a:style>
+    </a:lnDef>
+  </a:objectDefaults>
+  <a:extraClrSchemeLst/>
+  <a:extLst>
+    <a:ext uri="{05A4C25C-085E-4340-85A3-A5531E510DB2}">
+      <thm15:themeFamily xmlns:thm15="http://schemas.microsoft.com/office/thememl/2012/main" name="Office Theme" id="{2E142A2C-CD16-42D6-873A-C26D2A0506FA}" vid="{1BDDFF52-6CD6-40A5-AB3C-68EB2F1E4D0A}"/>
+    </a:ext>
+  </a:extLst>
+</a:theme>
 </file>
</xml_diff>